<commit_message>
resignation design 18/1/24 18:41
</commit_message>
<xml_diff>
--- a/New Microsoft PowerPoint Presentation.pptx
+++ b/New Microsoft PowerPoint Presentation.pptx
@@ -6,8 +6,12 @@
   </p:sldMasterIdLst>
   <p:sldIdLst>
     <p:sldId id="256" r:id="rId2"/>
-    <p:sldId id="258" r:id="rId3"/>
-    <p:sldId id="257" r:id="rId4"/>
+    <p:sldId id="260" r:id="rId3"/>
+    <p:sldId id="258" r:id="rId4"/>
+    <p:sldId id="259" r:id="rId5"/>
+    <p:sldId id="261" r:id="rId6"/>
+    <p:sldId id="262" r:id="rId7"/>
+    <p:sldId id="257" r:id="rId8"/>
   </p:sldIdLst>
   <p:sldSz cx="18288000" cy="10287000"/>
   <p:notesSz cx="6858000" cy="9144000"/>
@@ -245,7 +249,7 @@
           <a:p>
             <a:fld id="{6979B424-ED28-4BEC-8A28-BF427314F3CE}" type="datetimeFigureOut">
               <a:rPr lang="en-US" smtClean="0"/>
-              <a:t>1/17/2025</a:t>
+              <a:t>1/18/2025</a:t>
             </a:fld>
             <a:endParaRPr lang="en-US"/>
           </a:p>
@@ -415,7 +419,7 @@
           <a:p>
             <a:fld id="{6979B424-ED28-4BEC-8A28-BF427314F3CE}" type="datetimeFigureOut">
               <a:rPr lang="en-US" smtClean="0"/>
-              <a:t>1/17/2025</a:t>
+              <a:t>1/18/2025</a:t>
             </a:fld>
             <a:endParaRPr lang="en-US"/>
           </a:p>
@@ -595,7 +599,7 @@
           <a:p>
             <a:fld id="{6979B424-ED28-4BEC-8A28-BF427314F3CE}" type="datetimeFigureOut">
               <a:rPr lang="en-US" smtClean="0"/>
-              <a:t>1/17/2025</a:t>
+              <a:t>1/18/2025</a:t>
             </a:fld>
             <a:endParaRPr lang="en-US"/>
           </a:p>
@@ -765,7 +769,7 @@
           <a:p>
             <a:fld id="{6979B424-ED28-4BEC-8A28-BF427314F3CE}" type="datetimeFigureOut">
               <a:rPr lang="en-US" smtClean="0"/>
-              <a:t>1/17/2025</a:t>
+              <a:t>1/18/2025</a:t>
             </a:fld>
             <a:endParaRPr lang="en-US"/>
           </a:p>
@@ -1011,7 +1015,7 @@
           <a:p>
             <a:fld id="{6979B424-ED28-4BEC-8A28-BF427314F3CE}" type="datetimeFigureOut">
               <a:rPr lang="en-US" smtClean="0"/>
-              <a:t>1/17/2025</a:t>
+              <a:t>1/18/2025</a:t>
             </a:fld>
             <a:endParaRPr lang="en-US"/>
           </a:p>
@@ -1243,7 +1247,7 @@
           <a:p>
             <a:fld id="{6979B424-ED28-4BEC-8A28-BF427314F3CE}" type="datetimeFigureOut">
               <a:rPr lang="en-US" smtClean="0"/>
-              <a:t>1/17/2025</a:t>
+              <a:t>1/18/2025</a:t>
             </a:fld>
             <a:endParaRPr lang="en-US"/>
           </a:p>
@@ -1610,7 +1614,7 @@
           <a:p>
             <a:fld id="{6979B424-ED28-4BEC-8A28-BF427314F3CE}" type="datetimeFigureOut">
               <a:rPr lang="en-US" smtClean="0"/>
-              <a:t>1/17/2025</a:t>
+              <a:t>1/18/2025</a:t>
             </a:fld>
             <a:endParaRPr lang="en-US"/>
           </a:p>
@@ -1728,7 +1732,7 @@
           <a:p>
             <a:fld id="{6979B424-ED28-4BEC-8A28-BF427314F3CE}" type="datetimeFigureOut">
               <a:rPr lang="en-US" smtClean="0"/>
-              <a:t>1/17/2025</a:t>
+              <a:t>1/18/2025</a:t>
             </a:fld>
             <a:endParaRPr lang="en-US"/>
           </a:p>
@@ -1823,7 +1827,7 @@
           <a:p>
             <a:fld id="{6979B424-ED28-4BEC-8A28-BF427314F3CE}" type="datetimeFigureOut">
               <a:rPr lang="en-US" smtClean="0"/>
-              <a:t>1/17/2025</a:t>
+              <a:t>1/18/2025</a:t>
             </a:fld>
             <a:endParaRPr lang="en-US"/>
           </a:p>
@@ -2100,7 +2104,7 @@
           <a:p>
             <a:fld id="{6979B424-ED28-4BEC-8A28-BF427314F3CE}" type="datetimeFigureOut">
               <a:rPr lang="en-US" smtClean="0"/>
-              <a:t>1/17/2025</a:t>
+              <a:t>1/18/2025</a:t>
             </a:fld>
             <a:endParaRPr lang="en-US"/>
           </a:p>
@@ -2357,7 +2361,7 @@
           <a:p>
             <a:fld id="{6979B424-ED28-4BEC-8A28-BF427314F3CE}" type="datetimeFigureOut">
               <a:rPr lang="en-US" smtClean="0"/>
-              <a:t>1/17/2025</a:t>
+              <a:t>1/18/2025</a:t>
             </a:fld>
             <a:endParaRPr lang="en-US"/>
           </a:p>
@@ -2570,7 +2574,7 @@
           <a:p>
             <a:fld id="{6979B424-ED28-4BEC-8A28-BF427314F3CE}" type="datetimeFigureOut">
               <a:rPr lang="en-US" smtClean="0"/>
-              <a:t>1/17/2025</a:t>
+              <a:t>1/18/2025</a:t>
             </a:fld>
             <a:endParaRPr lang="en-US"/>
           </a:p>
@@ -3154,12 +3158,183 @@
           </a:p>
         </p:txBody>
       </p:sp>
-      <p:sp>
-        <p:nvSpPr>
-          <p:cNvPr id="9" name="Rectangle: Rounded Corners 8">
-            <a:extLst>
-              <a:ext uri="{FF2B5EF4-FFF2-40B4-BE49-F238E27FC236}">
-                <a16:creationId xmlns:a16="http://schemas.microsoft.com/office/drawing/2014/main" id="{502D7F13-7F42-8314-7690-7DB208062EF9}"/>
+      <p:pic>
+        <p:nvPicPr>
+          <p:cNvPr id="15" name="Picture 14" descr="A blue and black logo&#10;&#10;Description automatically generated">
+            <a:extLst>
+              <a:ext uri="{FF2B5EF4-FFF2-40B4-BE49-F238E27FC236}">
+                <a16:creationId xmlns:a16="http://schemas.microsoft.com/office/drawing/2014/main" id="{82C9EC9F-BE46-B234-6FB4-DE7EDF6BBCEC}"/>
+              </a:ext>
+            </a:extLst>
+          </p:cNvPr>
+          <p:cNvPicPr preferRelativeResize="0">
+            <a:picLocks noChangeAspect="1"/>
+          </p:cNvPicPr>
+          <p:nvPr/>
+        </p:nvPicPr>
+        <p:blipFill>
+          <a:blip r:embed="rId2" cstate="print">
+            <a:extLst>
+              <a:ext uri="{28A0092B-C50C-407E-A947-70E740481C1C}">
+                <a14:useLocalDpi xmlns:a14="http://schemas.microsoft.com/office/drawing/2010/main" val="0"/>
+              </a:ext>
+            </a:extLst>
+          </a:blip>
+          <a:srcRect l="27137" t="16710" r="25806" b="43169"/>
+          <a:stretch/>
+        </p:blipFill>
+        <p:spPr>
+          <a:xfrm>
+            <a:off x="111949" y="-34240"/>
+            <a:ext cx="732113" cy="732113"/>
+          </a:xfrm>
+          <a:prstGeom prst="rect">
+            <a:avLst/>
+          </a:prstGeom>
+        </p:spPr>
+      </p:pic>
+      <p:sp>
+        <p:nvSpPr>
+          <p:cNvPr id="16" name="TextBox 15">
+            <a:extLst>
+              <a:ext uri="{FF2B5EF4-FFF2-40B4-BE49-F238E27FC236}">
+                <a16:creationId xmlns:a16="http://schemas.microsoft.com/office/drawing/2014/main" id="{DF376B66-A61E-EB67-CDA1-0D13ECFEFA27}"/>
+              </a:ext>
+            </a:extLst>
+          </p:cNvPr>
+          <p:cNvSpPr txBox="1"/>
+          <p:nvPr/>
+        </p:nvSpPr>
+        <p:spPr>
+          <a:xfrm>
+            <a:off x="815332" y="-22127"/>
+            <a:ext cx="5096267" cy="707886"/>
+          </a:xfrm>
+          <a:prstGeom prst="rect">
+            <a:avLst/>
+          </a:prstGeom>
+          <a:noFill/>
+        </p:spPr>
+        <p:txBody>
+          <a:bodyPr wrap="none" rtlCol="0">
+            <a:spAutoFit/>
+          </a:bodyPr>
+          <a:lstStyle/>
+          <a:p>
+            <a:r>
+              <a:rPr lang="en-US" sz="4000" b="1" dirty="0" err="1">
+                <a:solidFill>
+                  <a:schemeClr val="bg1"/>
+                </a:solidFill>
+                <a:latin typeface="Bahnschrift SemiBold SemiConden" panose="020B0502040204020203" pitchFamily="34" charset="0"/>
+              </a:rPr>
+              <a:t>TechCore</a:t>
+            </a:r>
+            <a:r>
+              <a:rPr lang="en-US" sz="4000" b="1" dirty="0">
+                <a:solidFill>
+                  <a:schemeClr val="bg1"/>
+                </a:solidFill>
+                <a:latin typeface="Bahnschrift SemiBold SemiConden" panose="020B0502040204020203" pitchFamily="34" charset="0"/>
+              </a:rPr>
+              <a:t> Innovation- HR</a:t>
+            </a:r>
+          </a:p>
+        </p:txBody>
+      </p:sp>
+      <p:sp>
+        <p:nvSpPr>
+          <p:cNvPr id="2" name="TextBox 1">
+            <a:extLst>
+              <a:ext uri="{FF2B5EF4-FFF2-40B4-BE49-F238E27FC236}">
+                <a16:creationId xmlns:a16="http://schemas.microsoft.com/office/drawing/2014/main" id="{4ACB2042-90D9-023A-FFBF-62BC2B097948}"/>
+              </a:ext>
+            </a:extLst>
+          </p:cNvPr>
+          <p:cNvSpPr txBox="1"/>
+          <p:nvPr/>
+        </p:nvSpPr>
+        <p:spPr>
+          <a:xfrm>
+            <a:off x="602855" y="1181422"/>
+            <a:ext cx="1379417" cy="369332"/>
+          </a:xfrm>
+          <a:prstGeom prst="rect">
+            <a:avLst/>
+          </a:prstGeom>
+          <a:noFill/>
+        </p:spPr>
+        <p:txBody>
+          <a:bodyPr wrap="none" rtlCol="0">
+            <a:spAutoFit/>
+          </a:bodyPr>
+          <a:lstStyle/>
+          <a:p>
+            <a:r>
+              <a:rPr lang="en-US" b="1" dirty="0">
+                <a:solidFill>
+                  <a:schemeClr val="bg2">
+                    <a:lumMod val="25000"/>
+                  </a:schemeClr>
+                </a:solidFill>
+              </a:rPr>
+              <a:t>Date Range</a:t>
+            </a:r>
+          </a:p>
+        </p:txBody>
+      </p:sp>
+    </p:spTree>
+    <p:extLst>
+      <p:ext uri="{BB962C8B-B14F-4D97-AF65-F5344CB8AC3E}">
+        <p14:creationId xmlns:p14="http://schemas.microsoft.com/office/powerpoint/2010/main" val="4148624071"/>
+      </p:ext>
+    </p:extLst>
+  </p:cSld>
+  <p:clrMapOvr>
+    <a:masterClrMapping/>
+  </p:clrMapOvr>
+</p:sld>
+</file>
+
+<file path=ppt/slides/slide2.xml><?xml version="1.0" encoding="utf-8"?>
+<p:sld xmlns:a="http://schemas.openxmlformats.org/drawingml/2006/main" xmlns:r="http://schemas.openxmlformats.org/officeDocument/2006/relationships" xmlns:p="http://schemas.openxmlformats.org/presentationml/2006/main">
+  <p:cSld>
+    <p:bg>
+      <p:bgPr>
+        <a:solidFill>
+          <a:schemeClr val="bg1">
+            <a:lumMod val="95000"/>
+          </a:schemeClr>
+        </a:solidFill>
+        <a:effectLst/>
+      </p:bgPr>
+    </p:bg>
+    <p:spTree>
+      <p:nvGrpSpPr>
+        <p:cNvPr id="1" name="">
+          <a:extLst>
+            <a:ext uri="{FF2B5EF4-FFF2-40B4-BE49-F238E27FC236}">
+              <a16:creationId xmlns:a16="http://schemas.microsoft.com/office/drawing/2014/main" id="{04AEC289-3B22-0D11-6E42-2F521D8C61CF}"/>
+            </a:ext>
+          </a:extLst>
+        </p:cNvPr>
+        <p:cNvGrpSpPr/>
+        <p:nvPr/>
+      </p:nvGrpSpPr>
+      <p:grpSpPr>
+        <a:xfrm>
+          <a:off x="0" y="0"/>
+          <a:ext cx="0" cy="0"/>
+          <a:chOff x="0" y="0"/>
+          <a:chExt cx="0" cy="0"/>
+        </a:xfrm>
+      </p:grpSpPr>
+      <p:sp>
+        <p:nvSpPr>
+          <p:cNvPr id="6" name="Rectangle 5">
+            <a:extLst>
+              <a:ext uri="{FF2B5EF4-FFF2-40B4-BE49-F238E27FC236}">
+                <a16:creationId xmlns:a16="http://schemas.microsoft.com/office/drawing/2014/main" id="{99658B2A-B5B8-C148-9715-B5BF2FFF5095}"/>
               </a:ext>
             </a:extLst>
           </p:cNvPr>
@@ -3168,27 +3343,21 @@
         </p:nvSpPr>
         <p:spPr>
           <a:xfrm>
-            <a:off x="211015" y="1934309"/>
-            <a:ext cx="10374923" cy="3868614"/>
-          </a:xfrm>
-          <a:prstGeom prst="roundRect">
-            <a:avLst>
-              <a:gd name="adj" fmla="val 7996"/>
-            </a:avLst>
+            <a:off x="0" y="0"/>
+            <a:ext cx="18288000" cy="711200"/>
+          </a:xfrm>
+          <a:prstGeom prst="rect">
+            <a:avLst/>
           </a:prstGeom>
           <a:solidFill>
-            <a:schemeClr val="bg1">
-              <a:lumMod val="95000"/>
+            <a:schemeClr val="accent5">
+              <a:lumMod val="60000"/>
+              <a:lumOff val="40000"/>
             </a:schemeClr>
           </a:solidFill>
           <a:ln>
             <a:noFill/>
           </a:ln>
-          <a:effectLst>
-            <a:innerShdw blurRad="114300">
-              <a:prstClr val="black"/>
-            </a:innerShdw>
-          </a:effectLst>
         </p:spPr>
         <p:style>
           <a:lnRef idx="2">
@@ -3217,10 +3386,10 @@
       </p:sp>
       <p:sp>
         <p:nvSpPr>
-          <p:cNvPr id="11" name="Rectangle: Rounded Corners 10">
-            <a:extLst>
-              <a:ext uri="{FF2B5EF4-FFF2-40B4-BE49-F238E27FC236}">
-                <a16:creationId xmlns:a16="http://schemas.microsoft.com/office/drawing/2014/main" id="{928C0976-613F-450B-FA4D-67C97D754E9E}"/>
+          <p:cNvPr id="7" name="Rectangle 6">
+            <a:extLst>
+              <a:ext uri="{FF2B5EF4-FFF2-40B4-BE49-F238E27FC236}">
+                <a16:creationId xmlns:a16="http://schemas.microsoft.com/office/drawing/2014/main" id="{8CC0C682-3FA9-67A2-4147-2BFF3E5578B2}"/>
               </a:ext>
             </a:extLst>
           </p:cNvPr>
@@ -3229,27 +3398,21 @@
         </p:nvSpPr>
         <p:spPr>
           <a:xfrm>
-            <a:off x="211014" y="6471138"/>
-            <a:ext cx="10374924" cy="3708403"/>
-          </a:xfrm>
-          <a:prstGeom prst="roundRect">
-            <a:avLst>
-              <a:gd name="adj" fmla="val 7996"/>
-            </a:avLst>
+            <a:off x="0" y="711200"/>
+            <a:ext cx="18288000" cy="431800"/>
+          </a:xfrm>
+          <a:prstGeom prst="rect">
+            <a:avLst/>
           </a:prstGeom>
           <a:solidFill>
-            <a:schemeClr val="bg1">
-              <a:lumMod val="95000"/>
+            <a:schemeClr val="accent5">
+              <a:lumMod val="20000"/>
+              <a:lumOff val="80000"/>
             </a:schemeClr>
           </a:solidFill>
           <a:ln>
             <a:noFill/>
           </a:ln>
-          <a:effectLst>
-            <a:innerShdw blurRad="114300">
-              <a:prstClr val="black"/>
-            </a:innerShdw>
-          </a:effectLst>
         </p:spPr>
         <p:style>
           <a:lnRef idx="2">
@@ -3278,245 +3441,36 @@
       </p:sp>
       <p:sp>
         <p:nvSpPr>
-          <p:cNvPr id="12" name="TextBox 11">
-            <a:extLst>
-              <a:ext uri="{FF2B5EF4-FFF2-40B4-BE49-F238E27FC236}">
-                <a16:creationId xmlns:a16="http://schemas.microsoft.com/office/drawing/2014/main" id="{F1A03B79-77DF-4F6F-8611-76CB556A9FCE}"/>
-              </a:ext>
-            </a:extLst>
-          </p:cNvPr>
-          <p:cNvSpPr txBox="1"/>
-          <p:nvPr/>
-        </p:nvSpPr>
-        <p:spPr>
-          <a:xfrm>
-            <a:off x="602855" y="1574800"/>
-            <a:ext cx="2451890" cy="369332"/>
+          <p:cNvPr id="8" name="Rectangle 7">
+            <a:extLst>
+              <a:ext uri="{FF2B5EF4-FFF2-40B4-BE49-F238E27FC236}">
+                <a16:creationId xmlns:a16="http://schemas.microsoft.com/office/drawing/2014/main" id="{4BFAF3C6-CE9B-F106-3309-A0952EFEF307}"/>
+              </a:ext>
+            </a:extLst>
+          </p:cNvPr>
+          <p:cNvSpPr/>
+          <p:nvPr/>
+        </p:nvSpPr>
+        <p:spPr>
+          <a:xfrm>
+            <a:off x="0" y="1143000"/>
+            <a:ext cx="18288000" cy="431800"/>
           </a:xfrm>
           <a:prstGeom prst="rect">
             <a:avLst/>
           </a:prstGeom>
-          <a:noFill/>
-        </p:spPr>
-        <p:txBody>
-          <a:bodyPr wrap="none" rtlCol="0">
-            <a:spAutoFit/>
-          </a:bodyPr>
-          <a:lstStyle/>
-          <a:p>
-            <a:r>
-              <a:rPr lang="en-US" b="1" dirty="0">
-                <a:solidFill>
-                  <a:schemeClr val="bg2">
-                    <a:lumMod val="25000"/>
-                  </a:schemeClr>
-                </a:solidFill>
-              </a:rPr>
-              <a:t>Resignation Overview</a:t>
-            </a:r>
-          </a:p>
-        </p:txBody>
-      </p:sp>
-      <p:sp>
-        <p:nvSpPr>
-          <p:cNvPr id="13" name="TextBox 12">
-            <a:extLst>
-              <a:ext uri="{FF2B5EF4-FFF2-40B4-BE49-F238E27FC236}">
-                <a16:creationId xmlns:a16="http://schemas.microsoft.com/office/drawing/2014/main" id="{1AA7E0DD-0E4C-5091-4030-B2DC85B77F30}"/>
-              </a:ext>
-            </a:extLst>
-          </p:cNvPr>
-          <p:cNvSpPr txBox="1"/>
-          <p:nvPr/>
-        </p:nvSpPr>
-        <p:spPr>
-          <a:xfrm>
-            <a:off x="5152291" y="1574800"/>
-            <a:ext cx="2551789" cy="369332"/>
-          </a:xfrm>
-          <a:prstGeom prst="rect">
-            <a:avLst/>
-          </a:prstGeom>
-          <a:noFill/>
-        </p:spPr>
-        <p:txBody>
-          <a:bodyPr wrap="none" rtlCol="0">
-            <a:spAutoFit/>
-          </a:bodyPr>
-          <a:lstStyle/>
-          <a:p>
-            <a:r>
-              <a:rPr lang="en-US" b="1" dirty="0">
-                <a:solidFill>
-                  <a:schemeClr val="bg2">
-                    <a:lumMod val="25000"/>
-                  </a:schemeClr>
-                </a:solidFill>
-              </a:rPr>
-              <a:t>Resignation by Reason</a:t>
-            </a:r>
-          </a:p>
-        </p:txBody>
-      </p:sp>
-      <p:sp>
-        <p:nvSpPr>
-          <p:cNvPr id="14" name="TextBox 13">
-            <a:extLst>
-              <a:ext uri="{FF2B5EF4-FFF2-40B4-BE49-F238E27FC236}">
-                <a16:creationId xmlns:a16="http://schemas.microsoft.com/office/drawing/2014/main" id="{DAFE9A00-81B4-6570-585C-039025C202B7}"/>
-              </a:ext>
-            </a:extLst>
-          </p:cNvPr>
-          <p:cNvSpPr txBox="1"/>
-          <p:nvPr/>
-        </p:nvSpPr>
-        <p:spPr>
-          <a:xfrm>
-            <a:off x="11333541" y="1574800"/>
-            <a:ext cx="2540567" cy="369332"/>
-          </a:xfrm>
-          <a:prstGeom prst="rect">
-            <a:avLst/>
-          </a:prstGeom>
-          <a:noFill/>
-        </p:spPr>
-        <p:txBody>
-          <a:bodyPr wrap="none" rtlCol="0">
-            <a:spAutoFit/>
-          </a:bodyPr>
-          <a:lstStyle/>
-          <a:p>
-            <a:r>
-              <a:rPr lang="en-US" b="1" dirty="0">
-                <a:solidFill>
-                  <a:schemeClr val="bg2">
-                    <a:lumMod val="25000"/>
-                  </a:schemeClr>
-                </a:solidFill>
-              </a:rPr>
-              <a:t>Resignation by Gender</a:t>
-            </a:r>
-          </a:p>
-        </p:txBody>
-      </p:sp>
-      <p:pic>
-        <p:nvPicPr>
-          <p:cNvPr id="15" name="Picture 14" descr="A blue and black logo&#10;&#10;Description automatically generated">
-            <a:extLst>
-              <a:ext uri="{FF2B5EF4-FFF2-40B4-BE49-F238E27FC236}">
-                <a16:creationId xmlns:a16="http://schemas.microsoft.com/office/drawing/2014/main" id="{82C9EC9F-BE46-B234-6FB4-DE7EDF6BBCEC}"/>
-              </a:ext>
-            </a:extLst>
-          </p:cNvPr>
-          <p:cNvPicPr preferRelativeResize="0">
-            <a:picLocks noChangeAspect="1"/>
-          </p:cNvPicPr>
-          <p:nvPr/>
-        </p:nvPicPr>
-        <p:blipFill>
-          <a:blip r:embed="rId2" cstate="print">
-            <a:extLst>
-              <a:ext uri="{28A0092B-C50C-407E-A947-70E740481C1C}">
-                <a14:useLocalDpi xmlns:a14="http://schemas.microsoft.com/office/drawing/2010/main" val="0"/>
-              </a:ext>
-            </a:extLst>
-          </a:blip>
-          <a:srcRect l="27137" t="16710" r="25806" b="43169"/>
-          <a:stretch/>
-        </p:blipFill>
-        <p:spPr>
-          <a:xfrm>
-            <a:off x="111949" y="-34240"/>
-            <a:ext cx="732113" cy="732113"/>
-          </a:xfrm>
-          <a:prstGeom prst="rect">
-            <a:avLst/>
-          </a:prstGeom>
-        </p:spPr>
-      </p:pic>
-      <p:sp>
-        <p:nvSpPr>
-          <p:cNvPr id="16" name="TextBox 15">
-            <a:extLst>
-              <a:ext uri="{FF2B5EF4-FFF2-40B4-BE49-F238E27FC236}">
-                <a16:creationId xmlns:a16="http://schemas.microsoft.com/office/drawing/2014/main" id="{DF376B66-A61E-EB67-CDA1-0D13ECFEFA27}"/>
-              </a:ext>
-            </a:extLst>
-          </p:cNvPr>
-          <p:cNvSpPr txBox="1"/>
-          <p:nvPr/>
-        </p:nvSpPr>
-        <p:spPr>
-          <a:xfrm>
-            <a:off x="815332" y="-22127"/>
-            <a:ext cx="5096267" cy="707886"/>
-          </a:xfrm>
-          <a:prstGeom prst="rect">
-            <a:avLst/>
-          </a:prstGeom>
-          <a:noFill/>
-        </p:spPr>
-        <p:txBody>
-          <a:bodyPr wrap="none" rtlCol="0">
-            <a:spAutoFit/>
-          </a:bodyPr>
-          <a:lstStyle/>
-          <a:p>
-            <a:r>
-              <a:rPr lang="en-US" sz="4000" b="1" dirty="0" err="1">
-                <a:solidFill>
-                  <a:schemeClr val="bg1"/>
-                </a:solidFill>
-                <a:latin typeface="Bahnschrift SemiBold SemiConden" panose="020B0502040204020203" pitchFamily="34" charset="0"/>
-              </a:rPr>
-              <a:t>TechCore</a:t>
-            </a:r>
-            <a:r>
-              <a:rPr lang="en-US" sz="4000" b="1" dirty="0">
-                <a:solidFill>
-                  <a:schemeClr val="bg1"/>
-                </a:solidFill>
-                <a:latin typeface="Bahnschrift SemiBold SemiConden" panose="020B0502040204020203" pitchFamily="34" charset="0"/>
-              </a:rPr>
-              <a:t> Innovation- HR</a:t>
-            </a:r>
-          </a:p>
-        </p:txBody>
-      </p:sp>
-      <p:sp>
-        <p:nvSpPr>
-          <p:cNvPr id="19" name="Rectangle: Rounded Corners 18">
-            <a:extLst>
-              <a:ext uri="{FF2B5EF4-FFF2-40B4-BE49-F238E27FC236}">
-                <a16:creationId xmlns:a16="http://schemas.microsoft.com/office/drawing/2014/main" id="{4AD781D8-BB2A-2E30-7D4E-4203FF00DADD}"/>
-              </a:ext>
-            </a:extLst>
-          </p:cNvPr>
-          <p:cNvSpPr/>
-          <p:nvPr/>
-        </p:nvSpPr>
-        <p:spPr>
-          <a:xfrm>
-            <a:off x="10977778" y="1934309"/>
-            <a:ext cx="7099207" cy="3868614"/>
-          </a:xfrm>
-          <a:prstGeom prst="roundRect">
-            <a:avLst>
-              <a:gd name="adj" fmla="val 7996"/>
-            </a:avLst>
-          </a:prstGeom>
           <a:solidFill>
-            <a:schemeClr val="bg1">
-              <a:lumMod val="95000"/>
-            </a:schemeClr>
+            <a:schemeClr val="bg1"/>
           </a:solidFill>
           <a:ln>
             <a:noFill/>
           </a:ln>
           <a:effectLst>
-            <a:innerShdw blurRad="114300">
-              <a:prstClr val="black"/>
-            </a:innerShdw>
+            <a:outerShdw blurRad="50800" dist="38100" dir="5400000" algn="t" rotWithShape="0">
+              <a:prstClr val="black">
+                <a:alpha val="40000"/>
+              </a:prstClr>
+            </a:outerShdw>
           </a:effectLst>
         </p:spPr>
         <p:style>
@@ -3546,10 +3500,10 @@
       </p:sp>
       <p:sp>
         <p:nvSpPr>
-          <p:cNvPr id="20" name="Rectangle: Rounded Corners 19">
-            <a:extLst>
-              <a:ext uri="{FF2B5EF4-FFF2-40B4-BE49-F238E27FC236}">
-                <a16:creationId xmlns:a16="http://schemas.microsoft.com/office/drawing/2014/main" id="{37DC5078-C4C1-C39F-7E57-58FA80F162BF}"/>
+          <p:cNvPr id="9" name="Rectangle: Rounded Corners 8">
+            <a:extLst>
+              <a:ext uri="{FF2B5EF4-FFF2-40B4-BE49-F238E27FC236}">
+                <a16:creationId xmlns:a16="http://schemas.microsoft.com/office/drawing/2014/main" id="{C2F0E419-BD10-4CA8-A190-89C8DB86112F}"/>
               </a:ext>
             </a:extLst>
           </p:cNvPr>
@@ -3558,8 +3512,8 @@
         </p:nvSpPr>
         <p:spPr>
           <a:xfrm>
-            <a:off x="10977777" y="6471137"/>
-            <a:ext cx="7099207" cy="3708404"/>
+            <a:off x="211015" y="1934309"/>
+            <a:ext cx="10374923" cy="3868614"/>
           </a:xfrm>
           <a:prstGeom prst="roundRect">
             <a:avLst>
@@ -3607,10 +3561,400 @@
       </p:sp>
       <p:sp>
         <p:nvSpPr>
+          <p:cNvPr id="11" name="Rectangle: Rounded Corners 10">
+            <a:extLst>
+              <a:ext uri="{FF2B5EF4-FFF2-40B4-BE49-F238E27FC236}">
+                <a16:creationId xmlns:a16="http://schemas.microsoft.com/office/drawing/2014/main" id="{4970FEA8-9661-D48F-439B-20E589BFB1E0}"/>
+              </a:ext>
+            </a:extLst>
+          </p:cNvPr>
+          <p:cNvSpPr/>
+          <p:nvPr/>
+        </p:nvSpPr>
+        <p:spPr>
+          <a:xfrm>
+            <a:off x="211014" y="6471138"/>
+            <a:ext cx="10374924" cy="3708403"/>
+          </a:xfrm>
+          <a:prstGeom prst="roundRect">
+            <a:avLst>
+              <a:gd name="adj" fmla="val 7996"/>
+            </a:avLst>
+          </a:prstGeom>
+          <a:solidFill>
+            <a:schemeClr val="bg1">
+              <a:lumMod val="95000"/>
+            </a:schemeClr>
+          </a:solidFill>
+          <a:ln>
+            <a:noFill/>
+          </a:ln>
+          <a:effectLst>
+            <a:innerShdw blurRad="114300">
+              <a:prstClr val="black"/>
+            </a:innerShdw>
+          </a:effectLst>
+        </p:spPr>
+        <p:style>
+          <a:lnRef idx="2">
+            <a:schemeClr val="accent1">
+              <a:shade val="15000"/>
+            </a:schemeClr>
+          </a:lnRef>
+          <a:fillRef idx="1">
+            <a:schemeClr val="accent1"/>
+          </a:fillRef>
+          <a:effectRef idx="0">
+            <a:schemeClr val="accent1"/>
+          </a:effectRef>
+          <a:fontRef idx="minor">
+            <a:schemeClr val="lt1"/>
+          </a:fontRef>
+        </p:style>
+        <p:txBody>
+          <a:bodyPr rtlCol="0" anchor="ctr"/>
+          <a:lstStyle/>
+          <a:p>
+            <a:pPr algn="ctr"/>
+            <a:endParaRPr lang="en-US"/>
+          </a:p>
+        </p:txBody>
+      </p:sp>
+      <p:sp>
+        <p:nvSpPr>
+          <p:cNvPr id="12" name="TextBox 11">
+            <a:extLst>
+              <a:ext uri="{FF2B5EF4-FFF2-40B4-BE49-F238E27FC236}">
+                <a16:creationId xmlns:a16="http://schemas.microsoft.com/office/drawing/2014/main" id="{84F0D863-6497-2033-5AD9-DFA780CEF6A3}"/>
+              </a:ext>
+            </a:extLst>
+          </p:cNvPr>
+          <p:cNvSpPr txBox="1"/>
+          <p:nvPr/>
+        </p:nvSpPr>
+        <p:spPr>
+          <a:xfrm>
+            <a:off x="602855" y="1574800"/>
+            <a:ext cx="2451890" cy="369332"/>
+          </a:xfrm>
+          <a:prstGeom prst="rect">
+            <a:avLst/>
+          </a:prstGeom>
+          <a:noFill/>
+        </p:spPr>
+        <p:txBody>
+          <a:bodyPr wrap="none" rtlCol="0">
+            <a:spAutoFit/>
+          </a:bodyPr>
+          <a:lstStyle/>
+          <a:p>
+            <a:r>
+              <a:rPr lang="en-US" b="1" dirty="0">
+                <a:solidFill>
+                  <a:schemeClr val="bg2">
+                    <a:lumMod val="25000"/>
+                  </a:schemeClr>
+                </a:solidFill>
+              </a:rPr>
+              <a:t>Resignation Overview</a:t>
+            </a:r>
+          </a:p>
+        </p:txBody>
+      </p:sp>
+      <p:sp>
+        <p:nvSpPr>
+          <p:cNvPr id="13" name="TextBox 12">
+            <a:extLst>
+              <a:ext uri="{FF2B5EF4-FFF2-40B4-BE49-F238E27FC236}">
+                <a16:creationId xmlns:a16="http://schemas.microsoft.com/office/drawing/2014/main" id="{6479095C-BD81-281B-A03D-DDD4E6768A1C}"/>
+              </a:ext>
+            </a:extLst>
+          </p:cNvPr>
+          <p:cNvSpPr txBox="1"/>
+          <p:nvPr/>
+        </p:nvSpPr>
+        <p:spPr>
+          <a:xfrm>
+            <a:off x="5152291" y="1574800"/>
+            <a:ext cx="2551789" cy="369332"/>
+          </a:xfrm>
+          <a:prstGeom prst="rect">
+            <a:avLst/>
+          </a:prstGeom>
+          <a:noFill/>
+        </p:spPr>
+        <p:txBody>
+          <a:bodyPr wrap="none" rtlCol="0">
+            <a:spAutoFit/>
+          </a:bodyPr>
+          <a:lstStyle/>
+          <a:p>
+            <a:r>
+              <a:rPr lang="en-US" b="1" dirty="0">
+                <a:solidFill>
+                  <a:schemeClr val="bg2">
+                    <a:lumMod val="25000"/>
+                  </a:schemeClr>
+                </a:solidFill>
+              </a:rPr>
+              <a:t>Resignation by Reason</a:t>
+            </a:r>
+          </a:p>
+        </p:txBody>
+      </p:sp>
+      <p:sp>
+        <p:nvSpPr>
+          <p:cNvPr id="14" name="TextBox 13">
+            <a:extLst>
+              <a:ext uri="{FF2B5EF4-FFF2-40B4-BE49-F238E27FC236}">
+                <a16:creationId xmlns:a16="http://schemas.microsoft.com/office/drawing/2014/main" id="{3FA8C13F-43B2-BA7C-C7B9-2766C2664027}"/>
+              </a:ext>
+            </a:extLst>
+          </p:cNvPr>
+          <p:cNvSpPr txBox="1"/>
+          <p:nvPr/>
+        </p:nvSpPr>
+        <p:spPr>
+          <a:xfrm>
+            <a:off x="11333541" y="1574800"/>
+            <a:ext cx="2540567" cy="369332"/>
+          </a:xfrm>
+          <a:prstGeom prst="rect">
+            <a:avLst/>
+          </a:prstGeom>
+          <a:noFill/>
+        </p:spPr>
+        <p:txBody>
+          <a:bodyPr wrap="none" rtlCol="0">
+            <a:spAutoFit/>
+          </a:bodyPr>
+          <a:lstStyle/>
+          <a:p>
+            <a:r>
+              <a:rPr lang="en-US" b="1" dirty="0">
+                <a:solidFill>
+                  <a:schemeClr val="bg2">
+                    <a:lumMod val="25000"/>
+                  </a:schemeClr>
+                </a:solidFill>
+              </a:rPr>
+              <a:t>Resignation by Gender</a:t>
+            </a:r>
+          </a:p>
+        </p:txBody>
+      </p:sp>
+      <p:pic>
+        <p:nvPicPr>
+          <p:cNvPr id="15" name="Picture 14" descr="A blue and black logo&#10;&#10;Description automatically generated">
+            <a:extLst>
+              <a:ext uri="{FF2B5EF4-FFF2-40B4-BE49-F238E27FC236}">
+                <a16:creationId xmlns:a16="http://schemas.microsoft.com/office/drawing/2014/main" id="{BD917A5B-41A8-D57E-9C08-939CB58606EF}"/>
+              </a:ext>
+            </a:extLst>
+          </p:cNvPr>
+          <p:cNvPicPr preferRelativeResize="0">
+            <a:picLocks noChangeAspect="1"/>
+          </p:cNvPicPr>
+          <p:nvPr/>
+        </p:nvPicPr>
+        <p:blipFill>
+          <a:blip r:embed="rId2" cstate="print">
+            <a:extLst>
+              <a:ext uri="{28A0092B-C50C-407E-A947-70E740481C1C}">
+                <a14:useLocalDpi xmlns:a14="http://schemas.microsoft.com/office/drawing/2010/main" val="0"/>
+              </a:ext>
+            </a:extLst>
+          </a:blip>
+          <a:srcRect l="27137" t="16710" r="25806" b="43169"/>
+          <a:stretch/>
+        </p:blipFill>
+        <p:spPr>
+          <a:xfrm>
+            <a:off x="111949" y="-34240"/>
+            <a:ext cx="732113" cy="732113"/>
+          </a:xfrm>
+          <a:prstGeom prst="rect">
+            <a:avLst/>
+          </a:prstGeom>
+        </p:spPr>
+      </p:pic>
+      <p:sp>
+        <p:nvSpPr>
+          <p:cNvPr id="16" name="TextBox 15">
+            <a:extLst>
+              <a:ext uri="{FF2B5EF4-FFF2-40B4-BE49-F238E27FC236}">
+                <a16:creationId xmlns:a16="http://schemas.microsoft.com/office/drawing/2014/main" id="{B6388693-779B-63CA-8C34-CF62E79BED86}"/>
+              </a:ext>
+            </a:extLst>
+          </p:cNvPr>
+          <p:cNvSpPr txBox="1"/>
+          <p:nvPr/>
+        </p:nvSpPr>
+        <p:spPr>
+          <a:xfrm>
+            <a:off x="815332" y="-22127"/>
+            <a:ext cx="5096267" cy="707886"/>
+          </a:xfrm>
+          <a:prstGeom prst="rect">
+            <a:avLst/>
+          </a:prstGeom>
+          <a:noFill/>
+        </p:spPr>
+        <p:txBody>
+          <a:bodyPr wrap="none" rtlCol="0">
+            <a:spAutoFit/>
+          </a:bodyPr>
+          <a:lstStyle/>
+          <a:p>
+            <a:r>
+              <a:rPr lang="en-US" sz="4000" b="1" dirty="0" err="1">
+                <a:solidFill>
+                  <a:schemeClr val="bg1"/>
+                </a:solidFill>
+                <a:latin typeface="Bahnschrift SemiBold SemiConden" panose="020B0502040204020203" pitchFamily="34" charset="0"/>
+              </a:rPr>
+              <a:t>TechCore</a:t>
+            </a:r>
+            <a:r>
+              <a:rPr lang="en-US" sz="4000" b="1" dirty="0">
+                <a:solidFill>
+                  <a:schemeClr val="bg1"/>
+                </a:solidFill>
+                <a:latin typeface="Bahnschrift SemiBold SemiConden" panose="020B0502040204020203" pitchFamily="34" charset="0"/>
+              </a:rPr>
+              <a:t> Innovation- HR</a:t>
+            </a:r>
+          </a:p>
+        </p:txBody>
+      </p:sp>
+      <p:sp>
+        <p:nvSpPr>
+          <p:cNvPr id="19" name="Rectangle: Rounded Corners 18">
+            <a:extLst>
+              <a:ext uri="{FF2B5EF4-FFF2-40B4-BE49-F238E27FC236}">
+                <a16:creationId xmlns:a16="http://schemas.microsoft.com/office/drawing/2014/main" id="{D4D74A61-A305-C3DE-AEE7-C101BD4D1A5D}"/>
+              </a:ext>
+            </a:extLst>
+          </p:cNvPr>
+          <p:cNvSpPr/>
+          <p:nvPr/>
+        </p:nvSpPr>
+        <p:spPr>
+          <a:xfrm>
+            <a:off x="10977778" y="1934309"/>
+            <a:ext cx="7099207" cy="3868614"/>
+          </a:xfrm>
+          <a:prstGeom prst="roundRect">
+            <a:avLst>
+              <a:gd name="adj" fmla="val 7996"/>
+            </a:avLst>
+          </a:prstGeom>
+          <a:solidFill>
+            <a:schemeClr val="bg1">
+              <a:lumMod val="95000"/>
+            </a:schemeClr>
+          </a:solidFill>
+          <a:ln>
+            <a:noFill/>
+          </a:ln>
+          <a:effectLst>
+            <a:innerShdw blurRad="114300">
+              <a:prstClr val="black"/>
+            </a:innerShdw>
+          </a:effectLst>
+        </p:spPr>
+        <p:style>
+          <a:lnRef idx="2">
+            <a:schemeClr val="accent1">
+              <a:shade val="15000"/>
+            </a:schemeClr>
+          </a:lnRef>
+          <a:fillRef idx="1">
+            <a:schemeClr val="accent1"/>
+          </a:fillRef>
+          <a:effectRef idx="0">
+            <a:schemeClr val="accent1"/>
+          </a:effectRef>
+          <a:fontRef idx="minor">
+            <a:schemeClr val="lt1"/>
+          </a:fontRef>
+        </p:style>
+        <p:txBody>
+          <a:bodyPr rtlCol="0" anchor="ctr"/>
+          <a:lstStyle/>
+          <a:p>
+            <a:pPr algn="ctr"/>
+            <a:endParaRPr lang="en-US"/>
+          </a:p>
+        </p:txBody>
+      </p:sp>
+      <p:sp>
+        <p:nvSpPr>
+          <p:cNvPr id="20" name="Rectangle: Rounded Corners 19">
+            <a:extLst>
+              <a:ext uri="{FF2B5EF4-FFF2-40B4-BE49-F238E27FC236}">
+                <a16:creationId xmlns:a16="http://schemas.microsoft.com/office/drawing/2014/main" id="{7EC7BDF2-7881-8601-7488-CED69AF549FC}"/>
+              </a:ext>
+            </a:extLst>
+          </p:cNvPr>
+          <p:cNvSpPr/>
+          <p:nvPr/>
+        </p:nvSpPr>
+        <p:spPr>
+          <a:xfrm>
+            <a:off x="10977777" y="6471137"/>
+            <a:ext cx="7099207" cy="3708404"/>
+          </a:xfrm>
+          <a:prstGeom prst="roundRect">
+            <a:avLst>
+              <a:gd name="adj" fmla="val 7996"/>
+            </a:avLst>
+          </a:prstGeom>
+          <a:solidFill>
+            <a:schemeClr val="bg1">
+              <a:lumMod val="95000"/>
+            </a:schemeClr>
+          </a:solidFill>
+          <a:ln>
+            <a:noFill/>
+          </a:ln>
+          <a:effectLst>
+            <a:innerShdw blurRad="114300">
+              <a:prstClr val="black"/>
+            </a:innerShdw>
+          </a:effectLst>
+        </p:spPr>
+        <p:style>
+          <a:lnRef idx="2">
+            <a:schemeClr val="accent1">
+              <a:shade val="15000"/>
+            </a:schemeClr>
+          </a:lnRef>
+          <a:fillRef idx="1">
+            <a:schemeClr val="accent1"/>
+          </a:fillRef>
+          <a:effectRef idx="0">
+            <a:schemeClr val="accent1"/>
+          </a:effectRef>
+          <a:fontRef idx="minor">
+            <a:schemeClr val="lt1"/>
+          </a:fontRef>
+        </p:style>
+        <p:txBody>
+          <a:bodyPr rtlCol="0" anchor="ctr"/>
+          <a:lstStyle/>
+          <a:p>
+            <a:pPr algn="ctr"/>
+            <a:endParaRPr lang="en-US"/>
+          </a:p>
+        </p:txBody>
+      </p:sp>
+      <p:sp>
+        <p:nvSpPr>
           <p:cNvPr id="21" name="TextBox 20">
             <a:extLst>
               <a:ext uri="{FF2B5EF4-FFF2-40B4-BE49-F238E27FC236}">
-                <a16:creationId xmlns:a16="http://schemas.microsoft.com/office/drawing/2014/main" id="{2E82E20B-C3B8-676B-E42C-540FB27114C2}"/>
+                <a16:creationId xmlns:a16="http://schemas.microsoft.com/office/drawing/2014/main" id="{A7C16858-9887-1309-0EAD-AEFE7A0EDF0F}"/>
               </a:ext>
             </a:extLst>
           </p:cNvPr>
@@ -3651,7 +3995,7 @@
           <p:cNvPr id="22" name="TextBox 21">
             <a:extLst>
               <a:ext uri="{FF2B5EF4-FFF2-40B4-BE49-F238E27FC236}">
-                <a16:creationId xmlns:a16="http://schemas.microsoft.com/office/drawing/2014/main" id="{D5287477-3EF3-47D2-1F09-A26A24720488}"/>
+                <a16:creationId xmlns:a16="http://schemas.microsoft.com/office/drawing/2014/main" id="{FDB1AC1C-AFC7-8595-AC34-A069385CC317}"/>
               </a:ext>
             </a:extLst>
           </p:cNvPr>
@@ -3692,7 +4036,7 @@
           <p:cNvPr id="23" name="TextBox 22">
             <a:extLst>
               <a:ext uri="{FF2B5EF4-FFF2-40B4-BE49-F238E27FC236}">
-                <a16:creationId xmlns:a16="http://schemas.microsoft.com/office/drawing/2014/main" id="{FF23E3C4-2265-6F4B-8744-A902BFE2C5E8}"/>
+                <a16:creationId xmlns:a16="http://schemas.microsoft.com/office/drawing/2014/main" id="{A5B71380-FD92-18D0-3CC1-473E663C5E72}"/>
               </a:ext>
             </a:extLst>
           </p:cNvPr>
@@ -3728,10 +4072,51 @@
           </a:p>
         </p:txBody>
       </p:sp>
+      <p:sp>
+        <p:nvSpPr>
+          <p:cNvPr id="2" name="TextBox 1">
+            <a:extLst>
+              <a:ext uri="{FF2B5EF4-FFF2-40B4-BE49-F238E27FC236}">
+                <a16:creationId xmlns:a16="http://schemas.microsoft.com/office/drawing/2014/main" id="{91950956-2209-65C0-60B6-8E570FBF11D8}"/>
+              </a:ext>
+            </a:extLst>
+          </p:cNvPr>
+          <p:cNvSpPr txBox="1"/>
+          <p:nvPr/>
+        </p:nvSpPr>
+        <p:spPr>
+          <a:xfrm>
+            <a:off x="602855" y="1181422"/>
+            <a:ext cx="1379417" cy="369332"/>
+          </a:xfrm>
+          <a:prstGeom prst="rect">
+            <a:avLst/>
+          </a:prstGeom>
+          <a:noFill/>
+        </p:spPr>
+        <p:txBody>
+          <a:bodyPr wrap="none" rtlCol="0">
+            <a:spAutoFit/>
+          </a:bodyPr>
+          <a:lstStyle/>
+          <a:p>
+            <a:r>
+              <a:rPr lang="en-US" b="1" dirty="0">
+                <a:solidFill>
+                  <a:schemeClr val="bg2">
+                    <a:lumMod val="25000"/>
+                  </a:schemeClr>
+                </a:solidFill>
+              </a:rPr>
+              <a:t>Date Range</a:t>
+            </a:r>
+          </a:p>
+        </p:txBody>
+      </p:sp>
     </p:spTree>
     <p:extLst>
       <p:ext uri="{BB962C8B-B14F-4D97-AF65-F5344CB8AC3E}">
-        <p14:creationId xmlns:p14="http://schemas.microsoft.com/office/powerpoint/2010/main" val="4148624071"/>
+        <p14:creationId xmlns:p14="http://schemas.microsoft.com/office/powerpoint/2010/main" val="4167557534"/>
       </p:ext>
     </p:extLst>
   </p:cSld>
@@ -3741,7 +4126,7 @@
 </p:sld>
 </file>
 
-<file path=ppt/slides/slide2.xml><?xml version="1.0" encoding="utf-8"?>
+<file path=ppt/slides/slide3.xml><?xml version="1.0" encoding="utf-8"?>
 <p:sld xmlns:a="http://schemas.openxmlformats.org/drawingml/2006/main" xmlns:r="http://schemas.openxmlformats.org/officeDocument/2006/relationships" xmlns:p="http://schemas.openxmlformats.org/presentationml/2006/main">
   <p:cSld>
     <p:bg>
@@ -4120,7 +4505,7 @@
         </p:nvSpPr>
         <p:spPr>
           <a:xfrm>
-            <a:off x="3782438" y="1574800"/>
+            <a:off x="3446585" y="1574800"/>
             <a:ext cx="3172022" cy="369332"/>
           </a:xfrm>
           <a:prstGeom prst="rect">
@@ -4135,7 +4520,7 @@
           <a:lstStyle/>
           <a:p>
             <a:r>
-              <a:rPr lang="en-US" sz="1800" b="1">
+              <a:rPr lang="en-US" sz="1800" b="1" dirty="0">
                 <a:solidFill>
                   <a:srgbClr val="3A3A3A"/>
                 </a:solidFill>
@@ -4168,7 +4553,7 @@
         </p:nvSpPr>
         <p:spPr>
           <a:xfrm>
-            <a:off x="11333541" y="1574800"/>
+            <a:off x="12431614" y="1574800"/>
             <a:ext cx="5158079" cy="369332"/>
           </a:xfrm>
           <a:prstGeom prst="rect">
@@ -4483,7 +4868,7 @@
         </p:nvSpPr>
         <p:spPr>
           <a:xfrm>
-            <a:off x="10151302" y="4763462"/>
+            <a:off x="9143998" y="4763462"/>
             <a:ext cx="2310697" cy="369332"/>
           </a:xfrm>
           <a:prstGeom prst="rect">
@@ -4524,7 +4909,7 @@
         </p:nvSpPr>
         <p:spPr>
           <a:xfrm>
-            <a:off x="5262657" y="7618061"/>
+            <a:off x="6055315" y="7618061"/>
             <a:ext cx="2255489" cy="369332"/>
           </a:xfrm>
           <a:prstGeom prst="rect">
@@ -4565,7 +4950,7 @@
         </p:nvSpPr>
         <p:spPr>
           <a:xfrm>
-            <a:off x="12461999" y="7618061"/>
+            <a:off x="13657752" y="7618061"/>
             <a:ext cx="2705805" cy="369332"/>
           </a:xfrm>
           <a:prstGeom prst="rect">
@@ -4588,6 +4973,88 @@
                 </a:solidFill>
               </a:rPr>
               <a:t>Time to Quit by Location</a:t>
+            </a:r>
+          </a:p>
+        </p:txBody>
+      </p:sp>
+      <p:sp>
+        <p:nvSpPr>
+          <p:cNvPr id="17" name="TextBox 16">
+            <a:extLst>
+              <a:ext uri="{FF2B5EF4-FFF2-40B4-BE49-F238E27FC236}">
+                <a16:creationId xmlns:a16="http://schemas.microsoft.com/office/drawing/2014/main" id="{2CD67CD4-52A3-0911-BDD7-DA1B23858FC8}"/>
+              </a:ext>
+            </a:extLst>
+          </p:cNvPr>
+          <p:cNvSpPr txBox="1"/>
+          <p:nvPr/>
+        </p:nvSpPr>
+        <p:spPr>
+          <a:xfrm>
+            <a:off x="602855" y="1181422"/>
+            <a:ext cx="1379417" cy="369332"/>
+          </a:xfrm>
+          <a:prstGeom prst="rect">
+            <a:avLst/>
+          </a:prstGeom>
+          <a:noFill/>
+        </p:spPr>
+        <p:txBody>
+          <a:bodyPr wrap="none" rtlCol="0">
+            <a:spAutoFit/>
+          </a:bodyPr>
+          <a:lstStyle/>
+          <a:p>
+            <a:r>
+              <a:rPr lang="en-US" b="1" dirty="0">
+                <a:solidFill>
+                  <a:schemeClr val="bg2">
+                    <a:lumMod val="25000"/>
+                  </a:schemeClr>
+                </a:solidFill>
+              </a:rPr>
+              <a:t>Date Range</a:t>
+            </a:r>
+          </a:p>
+        </p:txBody>
+      </p:sp>
+      <p:sp>
+        <p:nvSpPr>
+          <p:cNvPr id="18" name="TextBox 17">
+            <a:extLst>
+              <a:ext uri="{FF2B5EF4-FFF2-40B4-BE49-F238E27FC236}">
+                <a16:creationId xmlns:a16="http://schemas.microsoft.com/office/drawing/2014/main" id="{1476D9D6-354A-88D7-BBEE-F7D5FC9098DA}"/>
+              </a:ext>
+            </a:extLst>
+          </p:cNvPr>
+          <p:cNvSpPr txBox="1"/>
+          <p:nvPr/>
+        </p:nvSpPr>
+        <p:spPr>
+          <a:xfrm>
+            <a:off x="5010984" y="1181422"/>
+            <a:ext cx="1452642" cy="369332"/>
+          </a:xfrm>
+          <a:prstGeom prst="rect">
+            <a:avLst/>
+          </a:prstGeom>
+          <a:noFill/>
+        </p:spPr>
+        <p:txBody>
+          <a:bodyPr wrap="none" rtlCol="0">
+            <a:spAutoFit/>
+          </a:bodyPr>
+          <a:lstStyle/>
+          <a:p>
+            <a:r>
+              <a:rPr lang="en-US" b="1" dirty="0">
+                <a:solidFill>
+                  <a:schemeClr val="bg2">
+                    <a:lumMod val="25000"/>
+                  </a:schemeClr>
+                </a:solidFill>
+              </a:rPr>
+              <a:t>Department</a:t>
             </a:r>
           </a:p>
         </p:txBody>
@@ -4605,7 +5072,1946 @@
 </p:sld>
 </file>
 
-<file path=ppt/slides/slide3.xml><?xml version="1.0" encoding="utf-8"?>
+<file path=ppt/slides/slide4.xml><?xml version="1.0" encoding="utf-8"?>
+<p:sld xmlns:a="http://schemas.openxmlformats.org/drawingml/2006/main" xmlns:r="http://schemas.openxmlformats.org/officeDocument/2006/relationships" xmlns:p="http://schemas.openxmlformats.org/presentationml/2006/main">
+  <p:cSld>
+    <p:bg>
+      <p:bgPr>
+        <a:solidFill>
+          <a:schemeClr val="bg1">
+            <a:lumMod val="95000"/>
+          </a:schemeClr>
+        </a:solidFill>
+        <a:effectLst/>
+      </p:bgPr>
+    </p:bg>
+    <p:spTree>
+      <p:nvGrpSpPr>
+        <p:cNvPr id="1" name="">
+          <a:extLst>
+            <a:ext uri="{FF2B5EF4-FFF2-40B4-BE49-F238E27FC236}">
+              <a16:creationId xmlns:a16="http://schemas.microsoft.com/office/drawing/2014/main" id="{029F954C-76DE-ACE0-2210-AA2C50F0E54D}"/>
+            </a:ext>
+          </a:extLst>
+        </p:cNvPr>
+        <p:cNvGrpSpPr/>
+        <p:nvPr/>
+      </p:nvGrpSpPr>
+      <p:grpSpPr>
+        <a:xfrm>
+          <a:off x="0" y="0"/>
+          <a:ext cx="0" cy="0"/>
+          <a:chOff x="0" y="0"/>
+          <a:chExt cx="0" cy="0"/>
+        </a:xfrm>
+      </p:grpSpPr>
+      <p:sp>
+        <p:nvSpPr>
+          <p:cNvPr id="6" name="Rectangle 5">
+            <a:extLst>
+              <a:ext uri="{FF2B5EF4-FFF2-40B4-BE49-F238E27FC236}">
+                <a16:creationId xmlns:a16="http://schemas.microsoft.com/office/drawing/2014/main" id="{1CB00961-A5BA-83B2-4BC7-CE521209C0E4}"/>
+              </a:ext>
+            </a:extLst>
+          </p:cNvPr>
+          <p:cNvSpPr/>
+          <p:nvPr/>
+        </p:nvSpPr>
+        <p:spPr>
+          <a:xfrm>
+            <a:off x="0" y="0"/>
+            <a:ext cx="18288000" cy="711200"/>
+          </a:xfrm>
+          <a:prstGeom prst="rect">
+            <a:avLst/>
+          </a:prstGeom>
+          <a:solidFill>
+            <a:schemeClr val="accent5">
+              <a:lumMod val="60000"/>
+              <a:lumOff val="40000"/>
+            </a:schemeClr>
+          </a:solidFill>
+          <a:ln>
+            <a:noFill/>
+          </a:ln>
+        </p:spPr>
+        <p:style>
+          <a:lnRef idx="2">
+            <a:schemeClr val="accent1">
+              <a:shade val="15000"/>
+            </a:schemeClr>
+          </a:lnRef>
+          <a:fillRef idx="1">
+            <a:schemeClr val="accent1"/>
+          </a:fillRef>
+          <a:effectRef idx="0">
+            <a:schemeClr val="accent1"/>
+          </a:effectRef>
+          <a:fontRef idx="minor">
+            <a:schemeClr val="lt1"/>
+          </a:fontRef>
+        </p:style>
+        <p:txBody>
+          <a:bodyPr rtlCol="0" anchor="ctr"/>
+          <a:lstStyle/>
+          <a:p>
+            <a:pPr algn="ctr"/>
+            <a:endParaRPr lang="en-US"/>
+          </a:p>
+        </p:txBody>
+      </p:sp>
+      <p:sp>
+        <p:nvSpPr>
+          <p:cNvPr id="7" name="Rectangle 6">
+            <a:extLst>
+              <a:ext uri="{FF2B5EF4-FFF2-40B4-BE49-F238E27FC236}">
+                <a16:creationId xmlns:a16="http://schemas.microsoft.com/office/drawing/2014/main" id="{0176316A-F1FC-81B8-5244-9DF444949794}"/>
+              </a:ext>
+            </a:extLst>
+          </p:cNvPr>
+          <p:cNvSpPr/>
+          <p:nvPr/>
+        </p:nvSpPr>
+        <p:spPr>
+          <a:xfrm>
+            <a:off x="0" y="711200"/>
+            <a:ext cx="18288000" cy="431800"/>
+          </a:xfrm>
+          <a:prstGeom prst="rect">
+            <a:avLst/>
+          </a:prstGeom>
+          <a:solidFill>
+            <a:schemeClr val="accent5">
+              <a:lumMod val="20000"/>
+              <a:lumOff val="80000"/>
+            </a:schemeClr>
+          </a:solidFill>
+          <a:ln>
+            <a:noFill/>
+          </a:ln>
+        </p:spPr>
+        <p:style>
+          <a:lnRef idx="2">
+            <a:schemeClr val="accent1">
+              <a:shade val="15000"/>
+            </a:schemeClr>
+          </a:lnRef>
+          <a:fillRef idx="1">
+            <a:schemeClr val="accent1"/>
+          </a:fillRef>
+          <a:effectRef idx="0">
+            <a:schemeClr val="accent1"/>
+          </a:effectRef>
+          <a:fontRef idx="minor">
+            <a:schemeClr val="lt1"/>
+          </a:fontRef>
+        </p:style>
+        <p:txBody>
+          <a:bodyPr rtlCol="0" anchor="ctr"/>
+          <a:lstStyle/>
+          <a:p>
+            <a:pPr algn="ctr"/>
+            <a:endParaRPr lang="en-US"/>
+          </a:p>
+        </p:txBody>
+      </p:sp>
+      <p:sp>
+        <p:nvSpPr>
+          <p:cNvPr id="8" name="Rectangle 7">
+            <a:extLst>
+              <a:ext uri="{FF2B5EF4-FFF2-40B4-BE49-F238E27FC236}">
+                <a16:creationId xmlns:a16="http://schemas.microsoft.com/office/drawing/2014/main" id="{B5E5FE81-94B1-45C5-C481-FD5A2B145145}"/>
+              </a:ext>
+            </a:extLst>
+          </p:cNvPr>
+          <p:cNvSpPr/>
+          <p:nvPr/>
+        </p:nvSpPr>
+        <p:spPr>
+          <a:xfrm>
+            <a:off x="0" y="1143000"/>
+            <a:ext cx="18288000" cy="431800"/>
+          </a:xfrm>
+          <a:prstGeom prst="rect">
+            <a:avLst/>
+          </a:prstGeom>
+          <a:solidFill>
+            <a:schemeClr val="bg1"/>
+          </a:solidFill>
+          <a:ln>
+            <a:noFill/>
+          </a:ln>
+          <a:effectLst>
+            <a:outerShdw blurRad="50800" dist="38100" dir="5400000" algn="t" rotWithShape="0">
+              <a:prstClr val="black">
+                <a:alpha val="40000"/>
+              </a:prstClr>
+            </a:outerShdw>
+          </a:effectLst>
+        </p:spPr>
+        <p:style>
+          <a:lnRef idx="2">
+            <a:schemeClr val="accent1">
+              <a:shade val="15000"/>
+            </a:schemeClr>
+          </a:lnRef>
+          <a:fillRef idx="1">
+            <a:schemeClr val="accent1"/>
+          </a:fillRef>
+          <a:effectRef idx="0">
+            <a:schemeClr val="accent1"/>
+          </a:effectRef>
+          <a:fontRef idx="minor">
+            <a:schemeClr val="lt1"/>
+          </a:fontRef>
+        </p:style>
+        <p:txBody>
+          <a:bodyPr rtlCol="0" anchor="ctr"/>
+          <a:lstStyle/>
+          <a:p>
+            <a:pPr algn="ctr"/>
+            <a:endParaRPr lang="en-US"/>
+          </a:p>
+        </p:txBody>
+      </p:sp>
+      <p:sp>
+        <p:nvSpPr>
+          <p:cNvPr id="9" name="Rectangle: Rounded Corners 8">
+            <a:extLst>
+              <a:ext uri="{FF2B5EF4-FFF2-40B4-BE49-F238E27FC236}">
+                <a16:creationId xmlns:a16="http://schemas.microsoft.com/office/drawing/2014/main" id="{C2C99D70-B52C-DE5B-510D-A8F705813EF6}"/>
+              </a:ext>
+            </a:extLst>
+          </p:cNvPr>
+          <p:cNvSpPr/>
+          <p:nvPr/>
+        </p:nvSpPr>
+        <p:spPr>
+          <a:xfrm>
+            <a:off x="211015" y="2245948"/>
+            <a:ext cx="17865969" cy="3868614"/>
+          </a:xfrm>
+          <a:prstGeom prst="roundRect">
+            <a:avLst>
+              <a:gd name="adj" fmla="val 7996"/>
+            </a:avLst>
+          </a:prstGeom>
+          <a:solidFill>
+            <a:schemeClr val="bg1">
+              <a:lumMod val="95000"/>
+            </a:schemeClr>
+          </a:solidFill>
+          <a:ln>
+            <a:noFill/>
+          </a:ln>
+          <a:effectLst>
+            <a:innerShdw blurRad="114300">
+              <a:prstClr val="black"/>
+            </a:innerShdw>
+          </a:effectLst>
+        </p:spPr>
+        <p:style>
+          <a:lnRef idx="2">
+            <a:schemeClr val="accent1">
+              <a:shade val="15000"/>
+            </a:schemeClr>
+          </a:lnRef>
+          <a:fillRef idx="1">
+            <a:schemeClr val="accent1"/>
+          </a:fillRef>
+          <a:effectRef idx="0">
+            <a:schemeClr val="accent1"/>
+          </a:effectRef>
+          <a:fontRef idx="minor">
+            <a:schemeClr val="lt1"/>
+          </a:fontRef>
+        </p:style>
+        <p:txBody>
+          <a:bodyPr rtlCol="0" anchor="ctr"/>
+          <a:lstStyle/>
+          <a:p>
+            <a:pPr algn="ctr"/>
+            <a:endParaRPr lang="en-US"/>
+          </a:p>
+        </p:txBody>
+      </p:sp>
+      <p:sp>
+        <p:nvSpPr>
+          <p:cNvPr id="11" name="Rectangle: Rounded Corners 10">
+            <a:extLst>
+              <a:ext uri="{FF2B5EF4-FFF2-40B4-BE49-F238E27FC236}">
+                <a16:creationId xmlns:a16="http://schemas.microsoft.com/office/drawing/2014/main" id="{F6789F25-EDF1-2DCC-5997-C02F414640F8}"/>
+              </a:ext>
+            </a:extLst>
+          </p:cNvPr>
+          <p:cNvSpPr/>
+          <p:nvPr/>
+        </p:nvSpPr>
+        <p:spPr>
+          <a:xfrm>
+            <a:off x="211014" y="6471138"/>
+            <a:ext cx="17865968" cy="3708403"/>
+          </a:xfrm>
+          <a:prstGeom prst="roundRect">
+            <a:avLst>
+              <a:gd name="adj" fmla="val 7996"/>
+            </a:avLst>
+          </a:prstGeom>
+          <a:solidFill>
+            <a:schemeClr val="bg1">
+              <a:lumMod val="95000"/>
+            </a:schemeClr>
+          </a:solidFill>
+          <a:ln>
+            <a:noFill/>
+          </a:ln>
+          <a:effectLst>
+            <a:innerShdw blurRad="114300">
+              <a:prstClr val="black"/>
+            </a:innerShdw>
+          </a:effectLst>
+        </p:spPr>
+        <p:style>
+          <a:lnRef idx="2">
+            <a:schemeClr val="accent1">
+              <a:shade val="15000"/>
+            </a:schemeClr>
+          </a:lnRef>
+          <a:fillRef idx="1">
+            <a:schemeClr val="accent1"/>
+          </a:fillRef>
+          <a:effectRef idx="0">
+            <a:schemeClr val="accent1"/>
+          </a:effectRef>
+          <a:fontRef idx="minor">
+            <a:schemeClr val="lt1"/>
+          </a:fontRef>
+        </p:style>
+        <p:txBody>
+          <a:bodyPr rtlCol="0" anchor="ctr"/>
+          <a:lstStyle/>
+          <a:p>
+            <a:pPr algn="ctr"/>
+            <a:endParaRPr lang="en-US"/>
+          </a:p>
+        </p:txBody>
+      </p:sp>
+      <p:sp>
+        <p:nvSpPr>
+          <p:cNvPr id="12" name="TextBox 11">
+            <a:extLst>
+              <a:ext uri="{FF2B5EF4-FFF2-40B4-BE49-F238E27FC236}">
+                <a16:creationId xmlns:a16="http://schemas.microsoft.com/office/drawing/2014/main" id="{F4BA557C-7DB0-0CD7-DF83-A3155EB126C7}"/>
+              </a:ext>
+            </a:extLst>
+          </p:cNvPr>
+          <p:cNvSpPr txBox="1"/>
+          <p:nvPr/>
+        </p:nvSpPr>
+        <p:spPr>
+          <a:xfrm>
+            <a:off x="602855" y="1725708"/>
+            <a:ext cx="2600968" cy="369332"/>
+          </a:xfrm>
+          <a:prstGeom prst="rect">
+            <a:avLst/>
+          </a:prstGeom>
+          <a:noFill/>
+        </p:spPr>
+        <p:txBody>
+          <a:bodyPr wrap="none" rtlCol="0">
+            <a:spAutoFit/>
+          </a:bodyPr>
+          <a:lstStyle/>
+          <a:p>
+            <a:r>
+              <a:rPr lang="en-US" b="1" dirty="0">
+                <a:solidFill>
+                  <a:schemeClr val="bg2">
+                    <a:lumMod val="25000"/>
+                  </a:schemeClr>
+                </a:solidFill>
+              </a:rPr>
+              <a:t>Attrition Rate Overview</a:t>
+            </a:r>
+          </a:p>
+        </p:txBody>
+      </p:sp>
+      <p:sp>
+        <p:nvSpPr>
+          <p:cNvPr id="13" name="TextBox 12">
+            <a:extLst>
+              <a:ext uri="{FF2B5EF4-FFF2-40B4-BE49-F238E27FC236}">
+                <a16:creationId xmlns:a16="http://schemas.microsoft.com/office/drawing/2014/main" id="{CC78EF1A-C30E-A780-1AA6-6682DEACFFB7}"/>
+              </a:ext>
+            </a:extLst>
+          </p:cNvPr>
+          <p:cNvSpPr txBox="1"/>
+          <p:nvPr/>
+        </p:nvSpPr>
+        <p:spPr>
+          <a:xfrm>
+            <a:off x="3806678" y="1725708"/>
+            <a:ext cx="2700868" cy="369332"/>
+          </a:xfrm>
+          <a:prstGeom prst="rect">
+            <a:avLst/>
+          </a:prstGeom>
+          <a:noFill/>
+        </p:spPr>
+        <p:txBody>
+          <a:bodyPr wrap="square" rtlCol="0">
+            <a:spAutoFit/>
+          </a:bodyPr>
+          <a:lstStyle/>
+          <a:p>
+            <a:r>
+              <a:rPr lang="en-US" b="1" dirty="0">
+                <a:solidFill>
+                  <a:schemeClr val="bg2">
+                    <a:lumMod val="25000"/>
+                  </a:schemeClr>
+                </a:solidFill>
+              </a:rPr>
+              <a:t>Attrition Rate by</a:t>
+            </a:r>
+          </a:p>
+        </p:txBody>
+      </p:sp>
+      <p:pic>
+        <p:nvPicPr>
+          <p:cNvPr id="15" name="Picture 14" descr="A blue and black logo&#10;&#10;Description automatically generated">
+            <a:extLst>
+              <a:ext uri="{FF2B5EF4-FFF2-40B4-BE49-F238E27FC236}">
+                <a16:creationId xmlns:a16="http://schemas.microsoft.com/office/drawing/2014/main" id="{6CA31221-3D79-FF0A-A6BF-3886BD8C0B3A}"/>
+              </a:ext>
+            </a:extLst>
+          </p:cNvPr>
+          <p:cNvPicPr preferRelativeResize="0">
+            <a:picLocks noChangeAspect="1"/>
+          </p:cNvPicPr>
+          <p:nvPr/>
+        </p:nvPicPr>
+        <p:blipFill>
+          <a:blip r:embed="rId2" cstate="print">
+            <a:extLst>
+              <a:ext uri="{28A0092B-C50C-407E-A947-70E740481C1C}">
+                <a14:useLocalDpi xmlns:a14="http://schemas.microsoft.com/office/drawing/2010/main" val="0"/>
+              </a:ext>
+            </a:extLst>
+          </a:blip>
+          <a:srcRect l="27137" t="16710" r="25806" b="43169"/>
+          <a:stretch/>
+        </p:blipFill>
+        <p:spPr>
+          <a:xfrm>
+            <a:off x="111949" y="-34240"/>
+            <a:ext cx="732113" cy="732113"/>
+          </a:xfrm>
+          <a:prstGeom prst="rect">
+            <a:avLst/>
+          </a:prstGeom>
+        </p:spPr>
+      </p:pic>
+      <p:sp>
+        <p:nvSpPr>
+          <p:cNvPr id="16" name="TextBox 15">
+            <a:extLst>
+              <a:ext uri="{FF2B5EF4-FFF2-40B4-BE49-F238E27FC236}">
+                <a16:creationId xmlns:a16="http://schemas.microsoft.com/office/drawing/2014/main" id="{49958C71-696A-817C-3EC0-00062052F429}"/>
+              </a:ext>
+            </a:extLst>
+          </p:cNvPr>
+          <p:cNvSpPr txBox="1"/>
+          <p:nvPr/>
+        </p:nvSpPr>
+        <p:spPr>
+          <a:xfrm>
+            <a:off x="815332" y="-22127"/>
+            <a:ext cx="5096267" cy="707886"/>
+          </a:xfrm>
+          <a:prstGeom prst="rect">
+            <a:avLst/>
+          </a:prstGeom>
+          <a:noFill/>
+        </p:spPr>
+        <p:txBody>
+          <a:bodyPr wrap="none" rtlCol="0">
+            <a:spAutoFit/>
+          </a:bodyPr>
+          <a:lstStyle/>
+          <a:p>
+            <a:r>
+              <a:rPr lang="en-US" sz="4000" b="1" dirty="0" err="1">
+                <a:solidFill>
+                  <a:schemeClr val="bg1"/>
+                </a:solidFill>
+                <a:latin typeface="Bahnschrift SemiBold SemiConden" panose="020B0502040204020203" pitchFamily="34" charset="0"/>
+              </a:rPr>
+              <a:t>TechCore</a:t>
+            </a:r>
+            <a:r>
+              <a:rPr lang="en-US" sz="4000" b="1" dirty="0">
+                <a:solidFill>
+                  <a:schemeClr val="bg1"/>
+                </a:solidFill>
+                <a:latin typeface="Bahnschrift SemiBold SemiConden" panose="020B0502040204020203" pitchFamily="34" charset="0"/>
+              </a:rPr>
+              <a:t> Innovation- HR</a:t>
+            </a:r>
+          </a:p>
+        </p:txBody>
+      </p:sp>
+      <p:sp>
+        <p:nvSpPr>
+          <p:cNvPr id="22" name="TextBox 21">
+            <a:extLst>
+              <a:ext uri="{FF2B5EF4-FFF2-40B4-BE49-F238E27FC236}">
+                <a16:creationId xmlns:a16="http://schemas.microsoft.com/office/drawing/2014/main" id="{A961707F-CB16-79A2-3009-10CB2B172EF4}"/>
+              </a:ext>
+            </a:extLst>
+          </p:cNvPr>
+          <p:cNvSpPr txBox="1"/>
+          <p:nvPr/>
+        </p:nvSpPr>
+        <p:spPr>
+          <a:xfrm>
+            <a:off x="644915" y="6108184"/>
+            <a:ext cx="3347904" cy="369332"/>
+          </a:xfrm>
+          <a:prstGeom prst="rect">
+            <a:avLst/>
+          </a:prstGeom>
+          <a:noFill/>
+        </p:spPr>
+        <p:txBody>
+          <a:bodyPr wrap="none" rtlCol="0">
+            <a:spAutoFit/>
+          </a:bodyPr>
+          <a:lstStyle/>
+          <a:p>
+            <a:r>
+              <a:rPr lang="en-US" b="1" dirty="0">
+                <a:solidFill>
+                  <a:schemeClr val="bg2">
+                    <a:lumMod val="25000"/>
+                  </a:schemeClr>
+                </a:solidFill>
+              </a:rPr>
+              <a:t>Voluntary Attrition by Gender</a:t>
+            </a:r>
+          </a:p>
+        </p:txBody>
+      </p:sp>
+      <p:sp>
+        <p:nvSpPr>
+          <p:cNvPr id="23" name="TextBox 22">
+            <a:extLst>
+              <a:ext uri="{FF2B5EF4-FFF2-40B4-BE49-F238E27FC236}">
+                <a16:creationId xmlns:a16="http://schemas.microsoft.com/office/drawing/2014/main" id="{7A5B304F-E838-3344-68D7-352ACDFB406E}"/>
+              </a:ext>
+            </a:extLst>
+          </p:cNvPr>
+          <p:cNvSpPr txBox="1"/>
+          <p:nvPr/>
+        </p:nvSpPr>
+        <p:spPr>
+          <a:xfrm>
+            <a:off x="9645418" y="6108184"/>
+            <a:ext cx="3874137" cy="369332"/>
+          </a:xfrm>
+          <a:prstGeom prst="rect">
+            <a:avLst/>
+          </a:prstGeom>
+          <a:noFill/>
+        </p:spPr>
+        <p:txBody>
+          <a:bodyPr wrap="none" rtlCol="0">
+            <a:spAutoFit/>
+          </a:bodyPr>
+          <a:lstStyle/>
+          <a:p>
+            <a:r>
+              <a:rPr lang="en-US" b="1" dirty="0">
+                <a:solidFill>
+                  <a:schemeClr val="bg2">
+                    <a:lumMod val="25000"/>
+                  </a:schemeClr>
+                </a:solidFill>
+              </a:rPr>
+              <a:t>Overall and Voluntary Attrition Rate</a:t>
+            </a:r>
+          </a:p>
+        </p:txBody>
+      </p:sp>
+      <p:sp>
+        <p:nvSpPr>
+          <p:cNvPr id="2" name="TextBox 1">
+            <a:extLst>
+              <a:ext uri="{FF2B5EF4-FFF2-40B4-BE49-F238E27FC236}">
+                <a16:creationId xmlns:a16="http://schemas.microsoft.com/office/drawing/2014/main" id="{E29CC182-7315-3805-0335-430932EB1BF3}"/>
+              </a:ext>
+            </a:extLst>
+          </p:cNvPr>
+          <p:cNvSpPr txBox="1"/>
+          <p:nvPr/>
+        </p:nvSpPr>
+        <p:spPr>
+          <a:xfrm>
+            <a:off x="602855" y="1181422"/>
+            <a:ext cx="643061" cy="369332"/>
+          </a:xfrm>
+          <a:prstGeom prst="rect">
+            <a:avLst/>
+          </a:prstGeom>
+          <a:noFill/>
+        </p:spPr>
+        <p:txBody>
+          <a:bodyPr wrap="none" rtlCol="0">
+            <a:spAutoFit/>
+          </a:bodyPr>
+          <a:lstStyle/>
+          <a:p>
+            <a:r>
+              <a:rPr lang="en-US" b="1" dirty="0">
+                <a:solidFill>
+                  <a:schemeClr val="bg2">
+                    <a:lumMod val="25000"/>
+                  </a:schemeClr>
+                </a:solidFill>
+              </a:rPr>
+              <a:t>Year</a:t>
+            </a:r>
+          </a:p>
+        </p:txBody>
+      </p:sp>
+      <p:sp>
+        <p:nvSpPr>
+          <p:cNvPr id="3" name="TextBox 2">
+            <a:extLst>
+              <a:ext uri="{FF2B5EF4-FFF2-40B4-BE49-F238E27FC236}">
+                <a16:creationId xmlns:a16="http://schemas.microsoft.com/office/drawing/2014/main" id="{519CB702-3094-E8B3-4D1D-CF69D0242639}"/>
+              </a:ext>
+            </a:extLst>
+          </p:cNvPr>
+          <p:cNvSpPr txBox="1"/>
+          <p:nvPr/>
+        </p:nvSpPr>
+        <p:spPr>
+          <a:xfrm>
+            <a:off x="11119379" y="1725708"/>
+            <a:ext cx="2700868" cy="369332"/>
+          </a:xfrm>
+          <a:prstGeom prst="rect">
+            <a:avLst/>
+          </a:prstGeom>
+          <a:noFill/>
+        </p:spPr>
+        <p:txBody>
+          <a:bodyPr wrap="square" rtlCol="0">
+            <a:spAutoFit/>
+          </a:bodyPr>
+          <a:lstStyle/>
+          <a:p>
+            <a:r>
+              <a:rPr lang="en-US" b="1" dirty="0">
+                <a:solidFill>
+                  <a:schemeClr val="bg2">
+                    <a:lumMod val="25000"/>
+                  </a:schemeClr>
+                </a:solidFill>
+              </a:rPr>
+              <a:t>Attrition Rate by</a:t>
+            </a:r>
+          </a:p>
+        </p:txBody>
+      </p:sp>
+      <p:sp>
+        <p:nvSpPr>
+          <p:cNvPr id="4" name="TextBox 3">
+            <a:extLst>
+              <a:ext uri="{FF2B5EF4-FFF2-40B4-BE49-F238E27FC236}">
+                <a16:creationId xmlns:a16="http://schemas.microsoft.com/office/drawing/2014/main" id="{51DAEB14-9BED-AFE3-96FA-214E837A2DB5}"/>
+              </a:ext>
+            </a:extLst>
+          </p:cNvPr>
+          <p:cNvSpPr txBox="1"/>
+          <p:nvPr/>
+        </p:nvSpPr>
+        <p:spPr>
+          <a:xfrm>
+            <a:off x="2720404" y="1181422"/>
+            <a:ext cx="854721" cy="369332"/>
+          </a:xfrm>
+          <a:prstGeom prst="rect">
+            <a:avLst/>
+          </a:prstGeom>
+          <a:noFill/>
+        </p:spPr>
+        <p:txBody>
+          <a:bodyPr wrap="none" rtlCol="0">
+            <a:spAutoFit/>
+          </a:bodyPr>
+          <a:lstStyle/>
+          <a:p>
+            <a:r>
+              <a:rPr lang="en-US" b="1" dirty="0">
+                <a:solidFill>
+                  <a:schemeClr val="bg2">
+                    <a:lumMod val="25000"/>
+                  </a:schemeClr>
+                </a:solidFill>
+              </a:rPr>
+              <a:t>Month</a:t>
+            </a:r>
+          </a:p>
+        </p:txBody>
+      </p:sp>
+      <p:sp>
+        <p:nvSpPr>
+          <p:cNvPr id="5" name="TextBox 4">
+            <a:extLst>
+              <a:ext uri="{FF2B5EF4-FFF2-40B4-BE49-F238E27FC236}">
+                <a16:creationId xmlns:a16="http://schemas.microsoft.com/office/drawing/2014/main" id="{9F241DC6-7A00-10D3-553F-AD7A27B41A63}"/>
+              </a:ext>
+            </a:extLst>
+          </p:cNvPr>
+          <p:cNvSpPr txBox="1"/>
+          <p:nvPr/>
+        </p:nvSpPr>
+        <p:spPr>
+          <a:xfrm>
+            <a:off x="5484238" y="1181422"/>
+            <a:ext cx="1452642" cy="369332"/>
+          </a:xfrm>
+          <a:prstGeom prst="rect">
+            <a:avLst/>
+          </a:prstGeom>
+          <a:noFill/>
+        </p:spPr>
+        <p:txBody>
+          <a:bodyPr wrap="none" rtlCol="0">
+            <a:spAutoFit/>
+          </a:bodyPr>
+          <a:lstStyle/>
+          <a:p>
+            <a:r>
+              <a:rPr lang="en-US" b="1" dirty="0">
+                <a:solidFill>
+                  <a:schemeClr val="bg2">
+                    <a:lumMod val="25000"/>
+                  </a:schemeClr>
+                </a:solidFill>
+              </a:rPr>
+              <a:t>Department</a:t>
+            </a:r>
+          </a:p>
+        </p:txBody>
+      </p:sp>
+    </p:spTree>
+    <p:extLst>
+      <p:ext uri="{BB962C8B-B14F-4D97-AF65-F5344CB8AC3E}">
+        <p14:creationId xmlns:p14="http://schemas.microsoft.com/office/powerpoint/2010/main" val="1785402849"/>
+      </p:ext>
+    </p:extLst>
+  </p:cSld>
+  <p:clrMapOvr>
+    <a:masterClrMapping/>
+  </p:clrMapOvr>
+</p:sld>
+</file>
+
+<file path=ppt/slides/slide5.xml><?xml version="1.0" encoding="utf-8"?>
+<p:sld xmlns:a="http://schemas.openxmlformats.org/drawingml/2006/main" xmlns:r="http://schemas.openxmlformats.org/officeDocument/2006/relationships" xmlns:p="http://schemas.openxmlformats.org/presentationml/2006/main">
+  <p:cSld>
+    <p:bg>
+      <p:bgPr>
+        <a:solidFill>
+          <a:schemeClr val="bg1">
+            <a:lumMod val="95000"/>
+          </a:schemeClr>
+        </a:solidFill>
+        <a:effectLst/>
+      </p:bgPr>
+    </p:bg>
+    <p:spTree>
+      <p:nvGrpSpPr>
+        <p:cNvPr id="1" name="">
+          <a:extLst>
+            <a:ext uri="{FF2B5EF4-FFF2-40B4-BE49-F238E27FC236}">
+              <a16:creationId xmlns:a16="http://schemas.microsoft.com/office/drawing/2014/main" id="{3916021D-EDB7-A8C2-DE7D-3904E4453453}"/>
+            </a:ext>
+          </a:extLst>
+        </p:cNvPr>
+        <p:cNvGrpSpPr/>
+        <p:nvPr/>
+      </p:nvGrpSpPr>
+      <p:grpSpPr>
+        <a:xfrm>
+          <a:off x="0" y="0"/>
+          <a:ext cx="0" cy="0"/>
+          <a:chOff x="0" y="0"/>
+          <a:chExt cx="0" cy="0"/>
+        </a:xfrm>
+      </p:grpSpPr>
+      <p:sp>
+        <p:nvSpPr>
+          <p:cNvPr id="6" name="Rectangle 5">
+            <a:extLst>
+              <a:ext uri="{FF2B5EF4-FFF2-40B4-BE49-F238E27FC236}">
+                <a16:creationId xmlns:a16="http://schemas.microsoft.com/office/drawing/2014/main" id="{562BD3DE-4C55-39F9-20A0-24CBC8B9B986}"/>
+              </a:ext>
+            </a:extLst>
+          </p:cNvPr>
+          <p:cNvSpPr/>
+          <p:nvPr/>
+        </p:nvSpPr>
+        <p:spPr>
+          <a:xfrm>
+            <a:off x="0" y="0"/>
+            <a:ext cx="18288000" cy="711200"/>
+          </a:xfrm>
+          <a:prstGeom prst="rect">
+            <a:avLst/>
+          </a:prstGeom>
+          <a:solidFill>
+            <a:schemeClr val="accent5">
+              <a:lumMod val="60000"/>
+              <a:lumOff val="40000"/>
+            </a:schemeClr>
+          </a:solidFill>
+          <a:ln>
+            <a:noFill/>
+          </a:ln>
+        </p:spPr>
+        <p:style>
+          <a:lnRef idx="2">
+            <a:schemeClr val="accent1">
+              <a:shade val="15000"/>
+            </a:schemeClr>
+          </a:lnRef>
+          <a:fillRef idx="1">
+            <a:schemeClr val="accent1"/>
+          </a:fillRef>
+          <a:effectRef idx="0">
+            <a:schemeClr val="accent1"/>
+          </a:effectRef>
+          <a:fontRef idx="minor">
+            <a:schemeClr val="lt1"/>
+          </a:fontRef>
+        </p:style>
+        <p:txBody>
+          <a:bodyPr rtlCol="0" anchor="ctr"/>
+          <a:lstStyle/>
+          <a:p>
+            <a:pPr algn="ctr"/>
+            <a:endParaRPr lang="en-US"/>
+          </a:p>
+        </p:txBody>
+      </p:sp>
+      <p:sp>
+        <p:nvSpPr>
+          <p:cNvPr id="7" name="Rectangle 6">
+            <a:extLst>
+              <a:ext uri="{FF2B5EF4-FFF2-40B4-BE49-F238E27FC236}">
+                <a16:creationId xmlns:a16="http://schemas.microsoft.com/office/drawing/2014/main" id="{202696E0-9CEF-3DDC-AF5A-8D50F29758CA}"/>
+              </a:ext>
+            </a:extLst>
+          </p:cNvPr>
+          <p:cNvSpPr/>
+          <p:nvPr/>
+        </p:nvSpPr>
+        <p:spPr>
+          <a:xfrm>
+            <a:off x="0" y="711200"/>
+            <a:ext cx="18288000" cy="431800"/>
+          </a:xfrm>
+          <a:prstGeom prst="rect">
+            <a:avLst/>
+          </a:prstGeom>
+          <a:solidFill>
+            <a:schemeClr val="accent5">
+              <a:lumMod val="20000"/>
+              <a:lumOff val="80000"/>
+            </a:schemeClr>
+          </a:solidFill>
+          <a:ln>
+            <a:noFill/>
+          </a:ln>
+        </p:spPr>
+        <p:style>
+          <a:lnRef idx="2">
+            <a:schemeClr val="accent1">
+              <a:shade val="15000"/>
+            </a:schemeClr>
+          </a:lnRef>
+          <a:fillRef idx="1">
+            <a:schemeClr val="accent1"/>
+          </a:fillRef>
+          <a:effectRef idx="0">
+            <a:schemeClr val="accent1"/>
+          </a:effectRef>
+          <a:fontRef idx="minor">
+            <a:schemeClr val="lt1"/>
+          </a:fontRef>
+        </p:style>
+        <p:txBody>
+          <a:bodyPr rtlCol="0" anchor="ctr"/>
+          <a:lstStyle/>
+          <a:p>
+            <a:pPr algn="ctr"/>
+            <a:endParaRPr lang="en-US"/>
+          </a:p>
+        </p:txBody>
+      </p:sp>
+      <p:sp>
+        <p:nvSpPr>
+          <p:cNvPr id="8" name="Rectangle 7">
+            <a:extLst>
+              <a:ext uri="{FF2B5EF4-FFF2-40B4-BE49-F238E27FC236}">
+                <a16:creationId xmlns:a16="http://schemas.microsoft.com/office/drawing/2014/main" id="{A019F542-54DC-7CB7-FE55-BA0581228A75}"/>
+              </a:ext>
+            </a:extLst>
+          </p:cNvPr>
+          <p:cNvSpPr/>
+          <p:nvPr/>
+        </p:nvSpPr>
+        <p:spPr>
+          <a:xfrm>
+            <a:off x="0" y="1143000"/>
+            <a:ext cx="18288000" cy="431800"/>
+          </a:xfrm>
+          <a:prstGeom prst="rect">
+            <a:avLst/>
+          </a:prstGeom>
+          <a:solidFill>
+            <a:schemeClr val="bg1"/>
+          </a:solidFill>
+          <a:ln>
+            <a:noFill/>
+          </a:ln>
+          <a:effectLst>
+            <a:outerShdw blurRad="50800" dist="38100" dir="5400000" algn="t" rotWithShape="0">
+              <a:prstClr val="black">
+                <a:alpha val="40000"/>
+              </a:prstClr>
+            </a:outerShdw>
+          </a:effectLst>
+        </p:spPr>
+        <p:style>
+          <a:lnRef idx="2">
+            <a:schemeClr val="accent1">
+              <a:shade val="15000"/>
+            </a:schemeClr>
+          </a:lnRef>
+          <a:fillRef idx="1">
+            <a:schemeClr val="accent1"/>
+          </a:fillRef>
+          <a:effectRef idx="0">
+            <a:schemeClr val="accent1"/>
+          </a:effectRef>
+          <a:fontRef idx="minor">
+            <a:schemeClr val="lt1"/>
+          </a:fontRef>
+        </p:style>
+        <p:txBody>
+          <a:bodyPr rtlCol="0" anchor="ctr"/>
+          <a:lstStyle/>
+          <a:p>
+            <a:pPr algn="ctr"/>
+            <a:endParaRPr lang="en-US"/>
+          </a:p>
+        </p:txBody>
+      </p:sp>
+      <p:sp>
+        <p:nvSpPr>
+          <p:cNvPr id="9" name="Rectangle: Rounded Corners 8">
+            <a:extLst>
+              <a:ext uri="{FF2B5EF4-FFF2-40B4-BE49-F238E27FC236}">
+                <a16:creationId xmlns:a16="http://schemas.microsoft.com/office/drawing/2014/main" id="{AA6558C6-2850-A99D-4832-9B83C5C2154F}"/>
+              </a:ext>
+            </a:extLst>
+          </p:cNvPr>
+          <p:cNvSpPr/>
+          <p:nvPr/>
+        </p:nvSpPr>
+        <p:spPr>
+          <a:xfrm>
+            <a:off x="211016" y="1937753"/>
+            <a:ext cx="2992808" cy="5837781"/>
+          </a:xfrm>
+          <a:prstGeom prst="roundRect">
+            <a:avLst>
+              <a:gd name="adj" fmla="val 7996"/>
+            </a:avLst>
+          </a:prstGeom>
+          <a:solidFill>
+            <a:schemeClr val="bg1">
+              <a:lumMod val="95000"/>
+            </a:schemeClr>
+          </a:solidFill>
+          <a:ln>
+            <a:noFill/>
+          </a:ln>
+          <a:effectLst>
+            <a:innerShdw blurRad="114300">
+              <a:prstClr val="black"/>
+            </a:innerShdw>
+          </a:effectLst>
+        </p:spPr>
+        <p:style>
+          <a:lnRef idx="2">
+            <a:schemeClr val="accent1">
+              <a:shade val="15000"/>
+            </a:schemeClr>
+          </a:lnRef>
+          <a:fillRef idx="1">
+            <a:schemeClr val="accent1"/>
+          </a:fillRef>
+          <a:effectRef idx="0">
+            <a:schemeClr val="accent1"/>
+          </a:effectRef>
+          <a:fontRef idx="minor">
+            <a:schemeClr val="lt1"/>
+          </a:fontRef>
+        </p:style>
+        <p:txBody>
+          <a:bodyPr rtlCol="0" anchor="ctr"/>
+          <a:lstStyle/>
+          <a:p>
+            <a:pPr algn="ctr"/>
+            <a:endParaRPr lang="en-US"/>
+          </a:p>
+        </p:txBody>
+      </p:sp>
+      <p:sp>
+        <p:nvSpPr>
+          <p:cNvPr id="11" name="Rectangle: Rounded Corners 10">
+            <a:extLst>
+              <a:ext uri="{FF2B5EF4-FFF2-40B4-BE49-F238E27FC236}">
+                <a16:creationId xmlns:a16="http://schemas.microsoft.com/office/drawing/2014/main" id="{92901443-1539-A9C7-FC47-7B1929B8B02B}"/>
+              </a:ext>
+            </a:extLst>
+          </p:cNvPr>
+          <p:cNvSpPr/>
+          <p:nvPr/>
+        </p:nvSpPr>
+        <p:spPr>
+          <a:xfrm>
+            <a:off x="3446584" y="1937754"/>
+            <a:ext cx="14630397" cy="8241787"/>
+          </a:xfrm>
+          <a:prstGeom prst="roundRect">
+            <a:avLst>
+              <a:gd name="adj" fmla="val 2449"/>
+            </a:avLst>
+          </a:prstGeom>
+          <a:solidFill>
+            <a:schemeClr val="bg1">
+              <a:lumMod val="95000"/>
+            </a:schemeClr>
+          </a:solidFill>
+          <a:ln>
+            <a:noFill/>
+          </a:ln>
+          <a:effectLst>
+            <a:innerShdw blurRad="114300">
+              <a:prstClr val="black"/>
+            </a:innerShdw>
+          </a:effectLst>
+        </p:spPr>
+        <p:style>
+          <a:lnRef idx="2">
+            <a:schemeClr val="accent1">
+              <a:shade val="15000"/>
+            </a:schemeClr>
+          </a:lnRef>
+          <a:fillRef idx="1">
+            <a:schemeClr val="accent1"/>
+          </a:fillRef>
+          <a:effectRef idx="0">
+            <a:schemeClr val="accent1"/>
+          </a:effectRef>
+          <a:fontRef idx="minor">
+            <a:schemeClr val="lt1"/>
+          </a:fontRef>
+        </p:style>
+        <p:txBody>
+          <a:bodyPr rtlCol="0" anchor="ctr"/>
+          <a:lstStyle/>
+          <a:p>
+            <a:pPr algn="ctr"/>
+            <a:endParaRPr lang="en-US"/>
+          </a:p>
+        </p:txBody>
+      </p:sp>
+      <p:sp>
+        <p:nvSpPr>
+          <p:cNvPr id="12" name="TextBox 11">
+            <a:extLst>
+              <a:ext uri="{FF2B5EF4-FFF2-40B4-BE49-F238E27FC236}">
+                <a16:creationId xmlns:a16="http://schemas.microsoft.com/office/drawing/2014/main" id="{FF351B53-6D55-C4B8-6C10-5A585E43EC96}"/>
+              </a:ext>
+            </a:extLst>
+          </p:cNvPr>
+          <p:cNvSpPr txBox="1"/>
+          <p:nvPr/>
+        </p:nvSpPr>
+        <p:spPr>
+          <a:xfrm>
+            <a:off x="478005" y="1571611"/>
+            <a:ext cx="1991251" cy="369332"/>
+          </a:xfrm>
+          <a:prstGeom prst="rect">
+            <a:avLst/>
+          </a:prstGeom>
+          <a:noFill/>
+        </p:spPr>
+        <p:txBody>
+          <a:bodyPr wrap="none" rtlCol="0">
+            <a:spAutoFit/>
+          </a:bodyPr>
+          <a:lstStyle/>
+          <a:p>
+            <a:r>
+              <a:rPr lang="en-US" b="1" dirty="0">
+                <a:solidFill>
+                  <a:schemeClr val="bg2">
+                    <a:lumMod val="25000"/>
+                  </a:schemeClr>
+                </a:solidFill>
+              </a:rPr>
+              <a:t>Prediction Result</a:t>
+            </a:r>
+          </a:p>
+        </p:txBody>
+      </p:sp>
+      <p:pic>
+        <p:nvPicPr>
+          <p:cNvPr id="15" name="Picture 14" descr="A blue and black logo&#10;&#10;Description automatically generated">
+            <a:extLst>
+              <a:ext uri="{FF2B5EF4-FFF2-40B4-BE49-F238E27FC236}">
+                <a16:creationId xmlns:a16="http://schemas.microsoft.com/office/drawing/2014/main" id="{1790C7AA-6092-4E85-0CF1-C31D3323262B}"/>
+              </a:ext>
+            </a:extLst>
+          </p:cNvPr>
+          <p:cNvPicPr preferRelativeResize="0">
+            <a:picLocks noChangeAspect="1"/>
+          </p:cNvPicPr>
+          <p:nvPr/>
+        </p:nvPicPr>
+        <p:blipFill>
+          <a:blip r:embed="rId2" cstate="print">
+            <a:extLst>
+              <a:ext uri="{28A0092B-C50C-407E-A947-70E740481C1C}">
+                <a14:useLocalDpi xmlns:a14="http://schemas.microsoft.com/office/drawing/2010/main" val="0"/>
+              </a:ext>
+            </a:extLst>
+          </a:blip>
+          <a:srcRect l="27137" t="16710" r="25806" b="43169"/>
+          <a:stretch/>
+        </p:blipFill>
+        <p:spPr>
+          <a:xfrm>
+            <a:off x="111949" y="-34240"/>
+            <a:ext cx="732113" cy="732113"/>
+          </a:xfrm>
+          <a:prstGeom prst="rect">
+            <a:avLst/>
+          </a:prstGeom>
+        </p:spPr>
+      </p:pic>
+      <p:sp>
+        <p:nvSpPr>
+          <p:cNvPr id="16" name="TextBox 15">
+            <a:extLst>
+              <a:ext uri="{FF2B5EF4-FFF2-40B4-BE49-F238E27FC236}">
+                <a16:creationId xmlns:a16="http://schemas.microsoft.com/office/drawing/2014/main" id="{3D3D55D8-8B2C-5106-D909-AF735C9F227B}"/>
+              </a:ext>
+            </a:extLst>
+          </p:cNvPr>
+          <p:cNvSpPr txBox="1"/>
+          <p:nvPr/>
+        </p:nvSpPr>
+        <p:spPr>
+          <a:xfrm>
+            <a:off x="815332" y="-22127"/>
+            <a:ext cx="5096267" cy="707886"/>
+          </a:xfrm>
+          <a:prstGeom prst="rect">
+            <a:avLst/>
+          </a:prstGeom>
+          <a:noFill/>
+        </p:spPr>
+        <p:txBody>
+          <a:bodyPr wrap="none" rtlCol="0">
+            <a:spAutoFit/>
+          </a:bodyPr>
+          <a:lstStyle/>
+          <a:p>
+            <a:r>
+              <a:rPr lang="en-US" sz="4000" b="1" dirty="0" err="1">
+                <a:solidFill>
+                  <a:schemeClr val="bg1"/>
+                </a:solidFill>
+                <a:latin typeface="Bahnschrift SemiBold SemiConden" panose="020B0502040204020203" pitchFamily="34" charset="0"/>
+              </a:rPr>
+              <a:t>TechCore</a:t>
+            </a:r>
+            <a:r>
+              <a:rPr lang="en-US" sz="4000" b="1" dirty="0">
+                <a:solidFill>
+                  <a:schemeClr val="bg1"/>
+                </a:solidFill>
+                <a:latin typeface="Bahnschrift SemiBold SemiConden" panose="020B0502040204020203" pitchFamily="34" charset="0"/>
+              </a:rPr>
+              <a:t> Innovation- HR</a:t>
+            </a:r>
+          </a:p>
+        </p:txBody>
+      </p:sp>
+      <p:sp>
+        <p:nvSpPr>
+          <p:cNvPr id="2" name="TextBox 1">
+            <a:extLst>
+              <a:ext uri="{FF2B5EF4-FFF2-40B4-BE49-F238E27FC236}">
+                <a16:creationId xmlns:a16="http://schemas.microsoft.com/office/drawing/2014/main" id="{6F41ED3F-642F-0297-3237-886F2AF2816D}"/>
+              </a:ext>
+            </a:extLst>
+          </p:cNvPr>
+          <p:cNvSpPr txBox="1"/>
+          <p:nvPr/>
+        </p:nvSpPr>
+        <p:spPr>
+          <a:xfrm>
+            <a:off x="478005" y="1181422"/>
+            <a:ext cx="1502655" cy="369332"/>
+          </a:xfrm>
+          <a:prstGeom prst="rect">
+            <a:avLst/>
+          </a:prstGeom>
+          <a:noFill/>
+        </p:spPr>
+        <p:txBody>
+          <a:bodyPr wrap="none" rtlCol="0">
+            <a:spAutoFit/>
+          </a:bodyPr>
+          <a:lstStyle/>
+          <a:p>
+            <a:r>
+              <a:rPr lang="en-US" b="1" dirty="0">
+                <a:solidFill>
+                  <a:schemeClr val="bg2">
+                    <a:lumMod val="25000"/>
+                  </a:schemeClr>
+                </a:solidFill>
+              </a:rPr>
+              <a:t>Employee ID</a:t>
+            </a:r>
+          </a:p>
+        </p:txBody>
+      </p:sp>
+      <p:sp>
+        <p:nvSpPr>
+          <p:cNvPr id="17" name="Rectangle: Rounded Corners 16">
+            <a:extLst>
+              <a:ext uri="{FF2B5EF4-FFF2-40B4-BE49-F238E27FC236}">
+                <a16:creationId xmlns:a16="http://schemas.microsoft.com/office/drawing/2014/main" id="{86ACBE52-2E53-10DB-E86A-DBD90D98BC0F}"/>
+              </a:ext>
+            </a:extLst>
+          </p:cNvPr>
+          <p:cNvSpPr/>
+          <p:nvPr/>
+        </p:nvSpPr>
+        <p:spPr>
+          <a:xfrm>
+            <a:off x="211016" y="8141677"/>
+            <a:ext cx="2992808" cy="2037863"/>
+          </a:xfrm>
+          <a:prstGeom prst="roundRect">
+            <a:avLst>
+              <a:gd name="adj" fmla="val 7996"/>
+            </a:avLst>
+          </a:prstGeom>
+          <a:solidFill>
+            <a:schemeClr val="bg1">
+              <a:lumMod val="95000"/>
+            </a:schemeClr>
+          </a:solidFill>
+          <a:ln>
+            <a:noFill/>
+          </a:ln>
+          <a:effectLst>
+            <a:innerShdw blurRad="114300">
+              <a:prstClr val="black"/>
+            </a:innerShdw>
+          </a:effectLst>
+        </p:spPr>
+        <p:style>
+          <a:lnRef idx="2">
+            <a:schemeClr val="accent1">
+              <a:shade val="15000"/>
+            </a:schemeClr>
+          </a:lnRef>
+          <a:fillRef idx="1">
+            <a:schemeClr val="accent1"/>
+          </a:fillRef>
+          <a:effectRef idx="0">
+            <a:schemeClr val="accent1"/>
+          </a:effectRef>
+          <a:fontRef idx="minor">
+            <a:schemeClr val="lt1"/>
+          </a:fontRef>
+        </p:style>
+        <p:txBody>
+          <a:bodyPr rtlCol="0" anchor="ctr"/>
+          <a:lstStyle/>
+          <a:p>
+            <a:pPr algn="ctr"/>
+            <a:endParaRPr lang="en-US"/>
+          </a:p>
+        </p:txBody>
+      </p:sp>
+      <p:sp>
+        <p:nvSpPr>
+          <p:cNvPr id="18" name="TextBox 17">
+            <a:extLst>
+              <a:ext uri="{FF2B5EF4-FFF2-40B4-BE49-F238E27FC236}">
+                <a16:creationId xmlns:a16="http://schemas.microsoft.com/office/drawing/2014/main" id="{BF42BEC2-6FE2-EB0F-1950-2425185213A1}"/>
+              </a:ext>
+            </a:extLst>
+          </p:cNvPr>
+          <p:cNvSpPr txBox="1"/>
+          <p:nvPr/>
+        </p:nvSpPr>
+        <p:spPr>
+          <a:xfrm>
+            <a:off x="478005" y="7766022"/>
+            <a:ext cx="2287357" cy="369332"/>
+          </a:xfrm>
+          <a:prstGeom prst="rect">
+            <a:avLst/>
+          </a:prstGeom>
+          <a:noFill/>
+        </p:spPr>
+        <p:txBody>
+          <a:bodyPr wrap="none" rtlCol="0">
+            <a:spAutoFit/>
+          </a:bodyPr>
+          <a:lstStyle/>
+          <a:p>
+            <a:r>
+              <a:rPr lang="en-US" b="1" dirty="0">
+                <a:solidFill>
+                  <a:schemeClr val="bg2">
+                    <a:lumMod val="25000"/>
+                  </a:schemeClr>
+                </a:solidFill>
+              </a:rPr>
+              <a:t>Prediction Accuracy</a:t>
+            </a:r>
+          </a:p>
+        </p:txBody>
+      </p:sp>
+      <p:sp>
+        <p:nvSpPr>
+          <p:cNvPr id="19" name="TextBox 18">
+            <a:extLst>
+              <a:ext uri="{FF2B5EF4-FFF2-40B4-BE49-F238E27FC236}">
+                <a16:creationId xmlns:a16="http://schemas.microsoft.com/office/drawing/2014/main" id="{C6C5BE1A-D504-BED5-F90D-E039E3A1098B}"/>
+              </a:ext>
+            </a:extLst>
+          </p:cNvPr>
+          <p:cNvSpPr txBox="1"/>
+          <p:nvPr/>
+        </p:nvSpPr>
+        <p:spPr>
+          <a:xfrm>
+            <a:off x="3681829" y="1571611"/>
+            <a:ext cx="4945585" cy="369332"/>
+          </a:xfrm>
+          <a:prstGeom prst="rect">
+            <a:avLst/>
+          </a:prstGeom>
+          <a:noFill/>
+        </p:spPr>
+        <p:txBody>
+          <a:bodyPr wrap="none" rtlCol="0">
+            <a:spAutoFit/>
+          </a:bodyPr>
+          <a:lstStyle/>
+          <a:p>
+            <a:r>
+              <a:rPr lang="en-US" b="1" dirty="0">
+                <a:solidFill>
+                  <a:schemeClr val="bg2">
+                    <a:lumMod val="25000"/>
+                  </a:schemeClr>
+                </a:solidFill>
+              </a:rPr>
+              <a:t>Likelihood of Resignation and Risk Probability</a:t>
+            </a:r>
+          </a:p>
+        </p:txBody>
+      </p:sp>
+    </p:spTree>
+    <p:extLst>
+      <p:ext uri="{BB962C8B-B14F-4D97-AF65-F5344CB8AC3E}">
+        <p14:creationId xmlns:p14="http://schemas.microsoft.com/office/powerpoint/2010/main" val="4244500799"/>
+      </p:ext>
+    </p:extLst>
+  </p:cSld>
+  <p:clrMapOvr>
+    <a:masterClrMapping/>
+  </p:clrMapOvr>
+</p:sld>
+</file>
+
+<file path=ppt/slides/slide6.xml><?xml version="1.0" encoding="utf-8"?>
+<p:sld xmlns:a="http://schemas.openxmlformats.org/drawingml/2006/main" xmlns:r="http://schemas.openxmlformats.org/officeDocument/2006/relationships" xmlns:p="http://schemas.openxmlformats.org/presentationml/2006/main">
+  <p:cSld>
+    <p:bg>
+      <p:bgPr>
+        <a:solidFill>
+          <a:schemeClr val="bg1">
+            <a:lumMod val="95000"/>
+          </a:schemeClr>
+        </a:solidFill>
+        <a:effectLst/>
+      </p:bgPr>
+    </p:bg>
+    <p:spTree>
+      <p:nvGrpSpPr>
+        <p:cNvPr id="1" name="">
+          <a:extLst>
+            <a:ext uri="{FF2B5EF4-FFF2-40B4-BE49-F238E27FC236}">
+              <a16:creationId xmlns:a16="http://schemas.microsoft.com/office/drawing/2014/main" id="{910C9299-81DF-29AF-0C0B-AAE25BED734D}"/>
+            </a:ext>
+          </a:extLst>
+        </p:cNvPr>
+        <p:cNvGrpSpPr/>
+        <p:nvPr/>
+      </p:nvGrpSpPr>
+      <p:grpSpPr>
+        <a:xfrm>
+          <a:off x="0" y="0"/>
+          <a:ext cx="0" cy="0"/>
+          <a:chOff x="0" y="0"/>
+          <a:chExt cx="0" cy="0"/>
+        </a:xfrm>
+      </p:grpSpPr>
+      <p:sp>
+        <p:nvSpPr>
+          <p:cNvPr id="6" name="Rectangle 5">
+            <a:extLst>
+              <a:ext uri="{FF2B5EF4-FFF2-40B4-BE49-F238E27FC236}">
+                <a16:creationId xmlns:a16="http://schemas.microsoft.com/office/drawing/2014/main" id="{874B30C7-4004-CF87-0A7F-678B02EBF202}"/>
+              </a:ext>
+            </a:extLst>
+          </p:cNvPr>
+          <p:cNvSpPr/>
+          <p:nvPr/>
+        </p:nvSpPr>
+        <p:spPr>
+          <a:xfrm>
+            <a:off x="0" y="0"/>
+            <a:ext cx="18288000" cy="711200"/>
+          </a:xfrm>
+          <a:prstGeom prst="rect">
+            <a:avLst/>
+          </a:prstGeom>
+          <a:solidFill>
+            <a:schemeClr val="accent5">
+              <a:lumMod val="60000"/>
+              <a:lumOff val="40000"/>
+            </a:schemeClr>
+          </a:solidFill>
+          <a:ln>
+            <a:noFill/>
+          </a:ln>
+        </p:spPr>
+        <p:style>
+          <a:lnRef idx="2">
+            <a:schemeClr val="accent1">
+              <a:shade val="15000"/>
+            </a:schemeClr>
+          </a:lnRef>
+          <a:fillRef idx="1">
+            <a:schemeClr val="accent1"/>
+          </a:fillRef>
+          <a:effectRef idx="0">
+            <a:schemeClr val="accent1"/>
+          </a:effectRef>
+          <a:fontRef idx="minor">
+            <a:schemeClr val="lt1"/>
+          </a:fontRef>
+        </p:style>
+        <p:txBody>
+          <a:bodyPr rtlCol="0" anchor="ctr"/>
+          <a:lstStyle/>
+          <a:p>
+            <a:pPr algn="ctr"/>
+            <a:endParaRPr lang="en-US"/>
+          </a:p>
+        </p:txBody>
+      </p:sp>
+      <p:sp>
+        <p:nvSpPr>
+          <p:cNvPr id="7" name="Rectangle 6">
+            <a:extLst>
+              <a:ext uri="{FF2B5EF4-FFF2-40B4-BE49-F238E27FC236}">
+                <a16:creationId xmlns:a16="http://schemas.microsoft.com/office/drawing/2014/main" id="{100D1ED4-CC6E-48E7-0C68-5A15B4FE8818}"/>
+              </a:ext>
+            </a:extLst>
+          </p:cNvPr>
+          <p:cNvSpPr/>
+          <p:nvPr/>
+        </p:nvSpPr>
+        <p:spPr>
+          <a:xfrm>
+            <a:off x="0" y="711200"/>
+            <a:ext cx="18288000" cy="431800"/>
+          </a:xfrm>
+          <a:prstGeom prst="rect">
+            <a:avLst/>
+          </a:prstGeom>
+          <a:solidFill>
+            <a:schemeClr val="accent5">
+              <a:lumMod val="20000"/>
+              <a:lumOff val="80000"/>
+            </a:schemeClr>
+          </a:solidFill>
+          <a:ln>
+            <a:noFill/>
+          </a:ln>
+        </p:spPr>
+        <p:style>
+          <a:lnRef idx="2">
+            <a:schemeClr val="accent1">
+              <a:shade val="15000"/>
+            </a:schemeClr>
+          </a:lnRef>
+          <a:fillRef idx="1">
+            <a:schemeClr val="accent1"/>
+          </a:fillRef>
+          <a:effectRef idx="0">
+            <a:schemeClr val="accent1"/>
+          </a:effectRef>
+          <a:fontRef idx="minor">
+            <a:schemeClr val="lt1"/>
+          </a:fontRef>
+        </p:style>
+        <p:txBody>
+          <a:bodyPr rtlCol="0" anchor="ctr"/>
+          <a:lstStyle/>
+          <a:p>
+            <a:pPr algn="ctr"/>
+            <a:endParaRPr lang="en-US"/>
+          </a:p>
+        </p:txBody>
+      </p:sp>
+      <p:sp>
+        <p:nvSpPr>
+          <p:cNvPr id="8" name="Rectangle 7">
+            <a:extLst>
+              <a:ext uri="{FF2B5EF4-FFF2-40B4-BE49-F238E27FC236}">
+                <a16:creationId xmlns:a16="http://schemas.microsoft.com/office/drawing/2014/main" id="{2D3B8AB6-6588-4C54-864B-9DC25B3FE4BA}"/>
+              </a:ext>
+            </a:extLst>
+          </p:cNvPr>
+          <p:cNvSpPr/>
+          <p:nvPr/>
+        </p:nvSpPr>
+        <p:spPr>
+          <a:xfrm>
+            <a:off x="0" y="1143000"/>
+            <a:ext cx="18288000" cy="431800"/>
+          </a:xfrm>
+          <a:prstGeom prst="rect">
+            <a:avLst/>
+          </a:prstGeom>
+          <a:solidFill>
+            <a:schemeClr val="bg1"/>
+          </a:solidFill>
+          <a:ln>
+            <a:noFill/>
+          </a:ln>
+          <a:effectLst>
+            <a:outerShdw blurRad="50800" dist="38100" dir="5400000" algn="t" rotWithShape="0">
+              <a:prstClr val="black">
+                <a:alpha val="40000"/>
+              </a:prstClr>
+            </a:outerShdw>
+          </a:effectLst>
+        </p:spPr>
+        <p:style>
+          <a:lnRef idx="2">
+            <a:schemeClr val="accent1">
+              <a:shade val="15000"/>
+            </a:schemeClr>
+          </a:lnRef>
+          <a:fillRef idx="1">
+            <a:schemeClr val="accent1"/>
+          </a:fillRef>
+          <a:effectRef idx="0">
+            <a:schemeClr val="accent1"/>
+          </a:effectRef>
+          <a:fontRef idx="minor">
+            <a:schemeClr val="lt1"/>
+          </a:fontRef>
+        </p:style>
+        <p:txBody>
+          <a:bodyPr rtlCol="0" anchor="ctr"/>
+          <a:lstStyle/>
+          <a:p>
+            <a:pPr algn="ctr"/>
+            <a:endParaRPr lang="en-US"/>
+          </a:p>
+        </p:txBody>
+      </p:sp>
+      <p:sp>
+        <p:nvSpPr>
+          <p:cNvPr id="9" name="Rectangle: Rounded Corners 8">
+            <a:extLst>
+              <a:ext uri="{FF2B5EF4-FFF2-40B4-BE49-F238E27FC236}">
+                <a16:creationId xmlns:a16="http://schemas.microsoft.com/office/drawing/2014/main" id="{0959CF6B-A6BD-70AC-C30B-08707F0B043D}"/>
+              </a:ext>
+            </a:extLst>
+          </p:cNvPr>
+          <p:cNvSpPr/>
+          <p:nvPr/>
+        </p:nvSpPr>
+        <p:spPr>
+          <a:xfrm>
+            <a:off x="211016" y="1937753"/>
+            <a:ext cx="17865965" cy="1192309"/>
+          </a:xfrm>
+          <a:prstGeom prst="roundRect">
+            <a:avLst>
+              <a:gd name="adj" fmla="val 7996"/>
+            </a:avLst>
+          </a:prstGeom>
+          <a:solidFill>
+            <a:schemeClr val="bg1">
+              <a:lumMod val="95000"/>
+            </a:schemeClr>
+          </a:solidFill>
+          <a:ln>
+            <a:noFill/>
+          </a:ln>
+          <a:effectLst>
+            <a:innerShdw blurRad="114300">
+              <a:prstClr val="black"/>
+            </a:innerShdw>
+          </a:effectLst>
+        </p:spPr>
+        <p:style>
+          <a:lnRef idx="2">
+            <a:schemeClr val="accent1">
+              <a:shade val="15000"/>
+            </a:schemeClr>
+          </a:lnRef>
+          <a:fillRef idx="1">
+            <a:schemeClr val="accent1"/>
+          </a:fillRef>
+          <a:effectRef idx="0">
+            <a:schemeClr val="accent1"/>
+          </a:effectRef>
+          <a:fontRef idx="minor">
+            <a:schemeClr val="lt1"/>
+          </a:fontRef>
+        </p:style>
+        <p:txBody>
+          <a:bodyPr rtlCol="0" anchor="ctr"/>
+          <a:lstStyle/>
+          <a:p>
+            <a:pPr algn="ctr"/>
+            <a:endParaRPr lang="en-US"/>
+          </a:p>
+        </p:txBody>
+      </p:sp>
+      <p:sp>
+        <p:nvSpPr>
+          <p:cNvPr id="11" name="Rectangle: Rounded Corners 10">
+            <a:extLst>
+              <a:ext uri="{FF2B5EF4-FFF2-40B4-BE49-F238E27FC236}">
+                <a16:creationId xmlns:a16="http://schemas.microsoft.com/office/drawing/2014/main" id="{B964CC56-322C-CF12-4B4D-8DB9523A92EC}"/>
+              </a:ext>
+            </a:extLst>
+          </p:cNvPr>
+          <p:cNvSpPr/>
+          <p:nvPr/>
+        </p:nvSpPr>
+        <p:spPr>
+          <a:xfrm>
+            <a:off x="211016" y="3493015"/>
+            <a:ext cx="17865965" cy="6686526"/>
+          </a:xfrm>
+          <a:prstGeom prst="roundRect">
+            <a:avLst>
+              <a:gd name="adj" fmla="val 2449"/>
+            </a:avLst>
+          </a:prstGeom>
+          <a:solidFill>
+            <a:schemeClr val="bg1">
+              <a:lumMod val="95000"/>
+            </a:schemeClr>
+          </a:solidFill>
+          <a:ln>
+            <a:noFill/>
+          </a:ln>
+          <a:effectLst>
+            <a:innerShdw blurRad="114300">
+              <a:prstClr val="black"/>
+            </a:innerShdw>
+          </a:effectLst>
+        </p:spPr>
+        <p:style>
+          <a:lnRef idx="2">
+            <a:schemeClr val="accent1">
+              <a:shade val="15000"/>
+            </a:schemeClr>
+          </a:lnRef>
+          <a:fillRef idx="1">
+            <a:schemeClr val="accent1"/>
+          </a:fillRef>
+          <a:effectRef idx="0">
+            <a:schemeClr val="accent1"/>
+          </a:effectRef>
+          <a:fontRef idx="minor">
+            <a:schemeClr val="lt1"/>
+          </a:fontRef>
+        </p:style>
+        <p:txBody>
+          <a:bodyPr rtlCol="0" anchor="ctr"/>
+          <a:lstStyle/>
+          <a:p>
+            <a:pPr algn="ctr"/>
+            <a:endParaRPr lang="en-US"/>
+          </a:p>
+        </p:txBody>
+      </p:sp>
+      <p:sp>
+        <p:nvSpPr>
+          <p:cNvPr id="12" name="TextBox 11">
+            <a:extLst>
+              <a:ext uri="{FF2B5EF4-FFF2-40B4-BE49-F238E27FC236}">
+                <a16:creationId xmlns:a16="http://schemas.microsoft.com/office/drawing/2014/main" id="{4F298846-12CD-E55C-D2AD-C25AF863E879}"/>
+              </a:ext>
+            </a:extLst>
+          </p:cNvPr>
+          <p:cNvSpPr txBox="1"/>
+          <p:nvPr/>
+        </p:nvSpPr>
+        <p:spPr>
+          <a:xfrm>
+            <a:off x="478005" y="1571611"/>
+            <a:ext cx="3303020" cy="369332"/>
+          </a:xfrm>
+          <a:prstGeom prst="rect">
+            <a:avLst/>
+          </a:prstGeom>
+          <a:noFill/>
+        </p:spPr>
+        <p:txBody>
+          <a:bodyPr wrap="none" rtlCol="0">
+            <a:spAutoFit/>
+          </a:bodyPr>
+          <a:lstStyle/>
+          <a:p>
+            <a:r>
+              <a:rPr lang="en-US" b="1" dirty="0">
+                <a:solidFill>
+                  <a:schemeClr val="bg2">
+                    <a:lumMod val="25000"/>
+                  </a:schemeClr>
+                </a:solidFill>
+              </a:rPr>
+              <a:t>Voluntary Attrition by Job Title</a:t>
+            </a:r>
+          </a:p>
+        </p:txBody>
+      </p:sp>
+      <p:pic>
+        <p:nvPicPr>
+          <p:cNvPr id="15" name="Picture 14" descr="A blue and black logo&#10;&#10;Description automatically generated">
+            <a:extLst>
+              <a:ext uri="{FF2B5EF4-FFF2-40B4-BE49-F238E27FC236}">
+                <a16:creationId xmlns:a16="http://schemas.microsoft.com/office/drawing/2014/main" id="{E7B2B5DC-32C5-F0B5-6690-AE9D6A359611}"/>
+              </a:ext>
+            </a:extLst>
+          </p:cNvPr>
+          <p:cNvPicPr preferRelativeResize="0">
+            <a:picLocks noChangeAspect="1"/>
+          </p:cNvPicPr>
+          <p:nvPr/>
+        </p:nvPicPr>
+        <p:blipFill>
+          <a:blip r:embed="rId2" cstate="print">
+            <a:extLst>
+              <a:ext uri="{28A0092B-C50C-407E-A947-70E740481C1C}">
+                <a14:useLocalDpi xmlns:a14="http://schemas.microsoft.com/office/drawing/2010/main" val="0"/>
+              </a:ext>
+            </a:extLst>
+          </a:blip>
+          <a:srcRect l="27137" t="16710" r="25806" b="43169"/>
+          <a:stretch/>
+        </p:blipFill>
+        <p:spPr>
+          <a:xfrm>
+            <a:off x="111949" y="-34240"/>
+            <a:ext cx="732113" cy="732113"/>
+          </a:xfrm>
+          <a:prstGeom prst="rect">
+            <a:avLst/>
+          </a:prstGeom>
+        </p:spPr>
+      </p:pic>
+      <p:sp>
+        <p:nvSpPr>
+          <p:cNvPr id="16" name="TextBox 15">
+            <a:extLst>
+              <a:ext uri="{FF2B5EF4-FFF2-40B4-BE49-F238E27FC236}">
+                <a16:creationId xmlns:a16="http://schemas.microsoft.com/office/drawing/2014/main" id="{7D052C79-4692-8F82-CC56-583001ED2007}"/>
+              </a:ext>
+            </a:extLst>
+          </p:cNvPr>
+          <p:cNvSpPr txBox="1"/>
+          <p:nvPr/>
+        </p:nvSpPr>
+        <p:spPr>
+          <a:xfrm>
+            <a:off x="815332" y="-22127"/>
+            <a:ext cx="5096267" cy="707886"/>
+          </a:xfrm>
+          <a:prstGeom prst="rect">
+            <a:avLst/>
+          </a:prstGeom>
+          <a:noFill/>
+        </p:spPr>
+        <p:txBody>
+          <a:bodyPr wrap="none" rtlCol="0">
+            <a:spAutoFit/>
+          </a:bodyPr>
+          <a:lstStyle/>
+          <a:p>
+            <a:r>
+              <a:rPr lang="en-US" sz="4000" b="1" dirty="0" err="1">
+                <a:solidFill>
+                  <a:schemeClr val="bg1"/>
+                </a:solidFill>
+                <a:latin typeface="Bahnschrift SemiBold SemiConden" panose="020B0502040204020203" pitchFamily="34" charset="0"/>
+              </a:rPr>
+              <a:t>TechCore</a:t>
+            </a:r>
+            <a:r>
+              <a:rPr lang="en-US" sz="4000" b="1" dirty="0">
+                <a:solidFill>
+                  <a:schemeClr val="bg1"/>
+                </a:solidFill>
+                <a:latin typeface="Bahnschrift SemiBold SemiConden" panose="020B0502040204020203" pitchFamily="34" charset="0"/>
+              </a:rPr>
+              <a:t> Innovation- HR</a:t>
+            </a:r>
+          </a:p>
+        </p:txBody>
+      </p:sp>
+      <p:sp>
+        <p:nvSpPr>
+          <p:cNvPr id="2" name="TextBox 1">
+            <a:extLst>
+              <a:ext uri="{FF2B5EF4-FFF2-40B4-BE49-F238E27FC236}">
+                <a16:creationId xmlns:a16="http://schemas.microsoft.com/office/drawing/2014/main" id="{82A0CBB9-B8E2-08CC-25A9-054140365016}"/>
+              </a:ext>
+            </a:extLst>
+          </p:cNvPr>
+          <p:cNvSpPr txBox="1"/>
+          <p:nvPr/>
+        </p:nvSpPr>
+        <p:spPr>
+          <a:xfrm>
+            <a:off x="478005" y="1181422"/>
+            <a:ext cx="1379417" cy="369332"/>
+          </a:xfrm>
+          <a:prstGeom prst="rect">
+            <a:avLst/>
+          </a:prstGeom>
+          <a:noFill/>
+        </p:spPr>
+        <p:txBody>
+          <a:bodyPr wrap="none" rtlCol="0">
+            <a:spAutoFit/>
+          </a:bodyPr>
+          <a:lstStyle/>
+          <a:p>
+            <a:r>
+              <a:rPr lang="en-US" b="1" dirty="0">
+                <a:solidFill>
+                  <a:schemeClr val="bg2">
+                    <a:lumMod val="25000"/>
+                  </a:schemeClr>
+                </a:solidFill>
+              </a:rPr>
+              <a:t>Date Range</a:t>
+            </a:r>
+          </a:p>
+        </p:txBody>
+      </p:sp>
+      <p:sp>
+        <p:nvSpPr>
+          <p:cNvPr id="19" name="TextBox 18">
+            <a:extLst>
+              <a:ext uri="{FF2B5EF4-FFF2-40B4-BE49-F238E27FC236}">
+                <a16:creationId xmlns:a16="http://schemas.microsoft.com/office/drawing/2014/main" id="{29FDD816-C081-BB2E-DE23-BE8B1833797F}"/>
+              </a:ext>
+            </a:extLst>
+          </p:cNvPr>
+          <p:cNvSpPr txBox="1"/>
+          <p:nvPr/>
+        </p:nvSpPr>
+        <p:spPr>
+          <a:xfrm>
+            <a:off x="478005" y="3126873"/>
+            <a:ext cx="2634504" cy="369332"/>
+          </a:xfrm>
+          <a:prstGeom prst="rect">
+            <a:avLst/>
+          </a:prstGeom>
+          <a:noFill/>
+        </p:spPr>
+        <p:txBody>
+          <a:bodyPr wrap="none" rtlCol="0">
+            <a:spAutoFit/>
+          </a:bodyPr>
+          <a:lstStyle/>
+          <a:p>
+            <a:r>
+              <a:rPr lang="en-US" b="1" dirty="0">
+                <a:solidFill>
+                  <a:schemeClr val="bg2">
+                    <a:lumMod val="25000"/>
+                  </a:schemeClr>
+                </a:solidFill>
+              </a:rPr>
+              <a:t>Voluntary Attrition Rate</a:t>
+            </a:r>
+          </a:p>
+        </p:txBody>
+      </p:sp>
+    </p:spTree>
+    <p:extLst>
+      <p:ext uri="{BB962C8B-B14F-4D97-AF65-F5344CB8AC3E}">
+        <p14:creationId xmlns:p14="http://schemas.microsoft.com/office/powerpoint/2010/main" val="2942267198"/>
+      </p:ext>
+    </p:extLst>
+  </p:cSld>
+  <p:clrMapOvr>
+    <a:masterClrMapping/>
+  </p:clrMapOvr>
+</p:sld>
+</file>
+
+<file path=ppt/slides/slide7.xml><?xml version="1.0" encoding="utf-8"?>
 <p:sld xmlns:a="http://schemas.openxmlformats.org/drawingml/2006/main" xmlns:r="http://schemas.openxmlformats.org/officeDocument/2006/relationships" xmlns:p="http://schemas.openxmlformats.org/presentationml/2006/main">
   <p:cSld>
     <p:spTree>

</xml_diff>